<commit_message>
[DOC] added some pictures and text to the presentation slides
</commit_message>
<xml_diff>
--- a/Slides/MedVis2.pptx
+++ b/Slides/MedVis2.pptx
@@ -5,20 +5,30 @@
     <p:sldMasterId id="2147483660" r:id="rId1"/>
   </p:sldMasterIdLst>
   <p:notesMasterIdLst>
-    <p:notesMasterId r:id="rId5"/>
+    <p:notesMasterId r:id="rId15"/>
   </p:notesMasterIdLst>
   <p:handoutMasterIdLst>
-    <p:handoutMasterId r:id="rId6"/>
+    <p:handoutMasterId r:id="rId16"/>
   </p:handoutMasterIdLst>
   <p:sldIdLst>
     <p:sldId id="259" r:id="rId2"/>
     <p:sldId id="260" r:id="rId3"/>
-    <p:sldId id="261" r:id="rId4"/>
+    <p:sldId id="267" r:id="rId4"/>
+    <p:sldId id="261" r:id="rId5"/>
+    <p:sldId id="269" r:id="rId6"/>
+    <p:sldId id="262" r:id="rId7"/>
+    <p:sldId id="263" r:id="rId8"/>
+    <p:sldId id="264" r:id="rId9"/>
+    <p:sldId id="265" r:id="rId10"/>
+    <p:sldId id="266" r:id="rId11"/>
+    <p:sldId id="268" r:id="rId12"/>
+    <p:sldId id="270" r:id="rId13"/>
+    <p:sldId id="271" r:id="rId14"/>
   </p:sldIdLst>
   <p:sldSz cx="9144000" cy="6858000" type="screen4x3"/>
   <p:notesSz cx="7099300" cy="10234613"/>
   <p:custDataLst>
-    <p:tags r:id="rId7"/>
+    <p:tags r:id="rId17"/>
   </p:custDataLst>
   <p:kinsoku lang="ja-JP" invalStChars="、。，．・：；？！゛゜ヽヾゝゞ々ー’”）〕］｝〉》」』】°‰′″℃￠％ぁぃぅぇぉっゃゅょゎァィゥェォッャュョヮヵヶ!%),.:;?]}｡｣､･ｧｨｩｪｫｬｭｮｯｰﾞﾟ" invalEndChars="‘“（〔［｛〈《「『【￥＄$([\{｢￡"/>
   <p:defaultTextStyle>
@@ -19286,7 +19296,6 @@
               <a:rPr lang="en-US" dirty="0" smtClean="0"/>
               <a:t> </a:t>
             </a:r>
-            <a:endParaRPr lang="en-US" dirty="0" smtClean="0"/>
           </a:p>
         </p:txBody>
       </p:sp>
@@ -19484,7 +19493,1047 @@
 </p:sld>
 </file>
 
+<file path=ppt/slides/slide10.xml><?xml version="1.0" encoding="utf-8"?>
+<p:sld xmlns:a="http://schemas.openxmlformats.org/drawingml/2006/main" xmlns:r="http://schemas.openxmlformats.org/officeDocument/2006/relationships" xmlns:p="http://schemas.openxmlformats.org/presentationml/2006/main">
+  <p:cSld>
+    <p:spTree>
+      <p:nvGrpSpPr>
+        <p:cNvPr id="1" name=""/>
+        <p:cNvGrpSpPr/>
+        <p:nvPr/>
+      </p:nvGrpSpPr>
+      <p:grpSpPr>
+        <a:xfrm>
+          <a:off x="0" y="0"/>
+          <a:ext cx="0" cy="0"/>
+          <a:chOff x="0" y="0"/>
+          <a:chExt cx="0" cy="0"/>
+        </a:xfrm>
+      </p:grpSpPr>
+      <p:sp>
+        <p:nvSpPr>
+          <p:cNvPr id="2" name="Title 1"/>
+          <p:cNvSpPr>
+            <a:spLocks noGrp="1"/>
+          </p:cNvSpPr>
+          <p:nvPr>
+            <p:ph type="title"/>
+          </p:nvPr>
+        </p:nvSpPr>
+        <p:spPr>
+          <a:xfrm>
+            <a:off x="467544" y="0"/>
+            <a:ext cx="7761287" cy="757238"/>
+          </a:xfrm>
+        </p:spPr>
+        <p:txBody>
+          <a:bodyPr/>
+          <a:lstStyle/>
+          <a:p>
+            <a:r>
+              <a:rPr lang="en-US" dirty="0" smtClean="0"/>
+              <a:t>Gradient Filter</a:t>
+            </a:r>
+            <a:endParaRPr lang="en-US" dirty="0"/>
+          </a:p>
+        </p:txBody>
+      </p:sp>
+      <p:sp>
+        <p:nvSpPr>
+          <p:cNvPr id="3" name="Content Placeholder 2"/>
+          <p:cNvSpPr>
+            <a:spLocks noGrp="1"/>
+          </p:cNvSpPr>
+          <p:nvPr>
+            <p:ph sz="half" idx="1"/>
+          </p:nvPr>
+        </p:nvSpPr>
+        <p:spPr/>
+        <p:txBody>
+          <a:bodyPr/>
+          <a:lstStyle/>
+          <a:p>
+            <a:r>
+              <a:rPr lang="en-US" dirty="0"/>
+              <a:t>TODO add non filtered</a:t>
+            </a:r>
+          </a:p>
+          <a:p>
+            <a:endParaRPr lang="en-US" dirty="0"/>
+          </a:p>
+        </p:txBody>
+      </p:sp>
+      <p:sp>
+        <p:nvSpPr>
+          <p:cNvPr id="4" name="Content Placeholder 3"/>
+          <p:cNvSpPr>
+            <a:spLocks noGrp="1"/>
+          </p:cNvSpPr>
+          <p:nvPr>
+            <p:ph sz="half" idx="2"/>
+          </p:nvPr>
+        </p:nvSpPr>
+        <p:spPr/>
+        <p:txBody>
+          <a:bodyPr/>
+          <a:lstStyle/>
+          <a:p>
+            <a:r>
+              <a:rPr lang="en-US" dirty="0"/>
+              <a:t>TODO add </a:t>
+            </a:r>
+            <a:r>
+              <a:rPr lang="en-US" dirty="0" smtClean="0"/>
+              <a:t>filtered</a:t>
+            </a:r>
+            <a:endParaRPr lang="en-US" dirty="0"/>
+          </a:p>
+          <a:p>
+            <a:endParaRPr lang="en-US" dirty="0"/>
+          </a:p>
+        </p:txBody>
+      </p:sp>
+      <p:sp>
+        <p:nvSpPr>
+          <p:cNvPr id="5" name="Footer Placeholder 4"/>
+          <p:cNvSpPr>
+            <a:spLocks noGrp="1"/>
+          </p:cNvSpPr>
+          <p:nvPr>
+            <p:ph type="ftr" sz="quarter" idx="10"/>
+          </p:nvPr>
+        </p:nvSpPr>
+        <p:spPr/>
+        <p:txBody>
+          <a:bodyPr/>
+          <a:lstStyle/>
+          <a:p>
+            <a:pPr>
+              <a:defRPr/>
+            </a:pPr>
+            <a:r>
+              <a:rPr lang="de-AT" dirty="0"/>
+              <a:t>Andreas </a:t>
+            </a:r>
+            <a:r>
+              <a:rPr lang="de-AT" dirty="0" err="1"/>
+              <a:t>Gogel</a:t>
+            </a:r>
+            <a:r>
+              <a:rPr lang="de-AT" dirty="0"/>
+              <a:t> </a:t>
+            </a:r>
+            <a:r>
+              <a:rPr lang="de-AT" dirty="0" err="1"/>
+              <a:t>and</a:t>
+            </a:r>
+            <a:r>
+              <a:rPr lang="de-AT" dirty="0"/>
+              <a:t> David Pfahler</a:t>
+            </a:r>
+            <a:endParaRPr lang="de-AT" dirty="0"/>
+          </a:p>
+        </p:txBody>
+      </p:sp>
+      <p:sp>
+        <p:nvSpPr>
+          <p:cNvPr id="6" name="Slide Number Placeholder 5"/>
+          <p:cNvSpPr>
+            <a:spLocks noGrp="1"/>
+          </p:cNvSpPr>
+          <p:nvPr>
+            <p:ph type="sldNum" sz="quarter" idx="11"/>
+          </p:nvPr>
+        </p:nvSpPr>
+        <p:spPr/>
+        <p:txBody>
+          <a:bodyPr/>
+          <a:lstStyle/>
+          <a:p>
+            <a:pPr>
+              <a:defRPr/>
+            </a:pPr>
+            <a:fld id="{63707275-EA33-4C2C-A96C-B80BEB93EE54}" type="slidenum">
+              <a:rPr lang="de-AT" smtClean="0"/>
+              <a:t>10</a:t>
+            </a:fld>
+            <a:endParaRPr lang="de-AT" dirty="0"/>
+          </a:p>
+        </p:txBody>
+      </p:sp>
+    </p:spTree>
+    <p:extLst>
+      <p:ext uri="{BB962C8B-B14F-4D97-AF65-F5344CB8AC3E}">
+        <p14:creationId xmlns:p14="http://schemas.microsoft.com/office/powerpoint/2010/main" val="1087487567"/>
+      </p:ext>
+    </p:extLst>
+  </p:cSld>
+  <p:clrMapOvr>
+    <a:masterClrMapping/>
+  </p:clrMapOvr>
+</p:sld>
+</file>
+
+<file path=ppt/slides/slide11.xml><?xml version="1.0" encoding="utf-8"?>
+<p:sld xmlns:a="http://schemas.openxmlformats.org/drawingml/2006/main" xmlns:r="http://schemas.openxmlformats.org/officeDocument/2006/relationships" xmlns:p="http://schemas.openxmlformats.org/presentationml/2006/main">
+  <p:cSld>
+    <p:spTree>
+      <p:nvGrpSpPr>
+        <p:cNvPr id="1" name=""/>
+        <p:cNvGrpSpPr/>
+        <p:nvPr/>
+      </p:nvGrpSpPr>
+      <p:grpSpPr>
+        <a:xfrm>
+          <a:off x="0" y="0"/>
+          <a:ext cx="0" cy="0"/>
+          <a:chOff x="0" y="0"/>
+          <a:chExt cx="0" cy="0"/>
+        </a:xfrm>
+      </p:grpSpPr>
+      <p:sp>
+        <p:nvSpPr>
+          <p:cNvPr id="2" name="Title 1"/>
+          <p:cNvSpPr>
+            <a:spLocks noGrp="1"/>
+          </p:cNvSpPr>
+          <p:nvPr>
+            <p:ph type="title"/>
+          </p:nvPr>
+        </p:nvSpPr>
+        <p:spPr>
+          <a:xfrm>
+            <a:off x="467544" y="0"/>
+            <a:ext cx="7761287" cy="757238"/>
+          </a:xfrm>
+        </p:spPr>
+        <p:txBody>
+          <a:bodyPr/>
+          <a:lstStyle/>
+          <a:p>
+            <a:r>
+              <a:rPr lang="en-US" dirty="0" smtClean="0"/>
+              <a:t>DVR</a:t>
+            </a:r>
+            <a:endParaRPr lang="en-US" dirty="0"/>
+          </a:p>
+        </p:txBody>
+      </p:sp>
+      <p:pic>
+        <p:nvPicPr>
+          <p:cNvPr id="8" name="Content Placeholder 7"/>
+          <p:cNvPicPr>
+            <a:picLocks noGrp="1" noChangeAspect="1"/>
+          </p:cNvPicPr>
+          <p:nvPr>
+            <p:ph sz="half" idx="2"/>
+          </p:nvPr>
+        </p:nvPicPr>
+        <p:blipFill>
+          <a:blip r:embed="rId2" cstate="print">
+            <a:extLst>
+              <a:ext uri="{28A0092B-C50C-407E-A947-70E740481C1C}">
+                <a14:useLocalDpi xmlns:a14="http://schemas.microsoft.com/office/drawing/2010/main" val="0"/>
+              </a:ext>
+            </a:extLst>
+          </a:blip>
+          <a:stretch>
+            <a:fillRect/>
+          </a:stretch>
+        </p:blipFill>
+        <p:spPr>
+          <a:xfrm>
+            <a:off x="4348187" y="1363611"/>
+            <a:ext cx="4352925" cy="4564362"/>
+          </a:xfrm>
+        </p:spPr>
+      </p:pic>
+      <p:sp>
+        <p:nvSpPr>
+          <p:cNvPr id="5" name="Footer Placeholder 4"/>
+          <p:cNvSpPr>
+            <a:spLocks noGrp="1"/>
+          </p:cNvSpPr>
+          <p:nvPr>
+            <p:ph type="ftr" sz="quarter" idx="10"/>
+          </p:nvPr>
+        </p:nvSpPr>
+        <p:spPr/>
+        <p:txBody>
+          <a:bodyPr/>
+          <a:lstStyle/>
+          <a:p>
+            <a:pPr>
+              <a:defRPr/>
+            </a:pPr>
+            <a:r>
+              <a:rPr lang="de-AT" dirty="0"/>
+              <a:t>Andreas </a:t>
+            </a:r>
+            <a:r>
+              <a:rPr lang="de-AT" dirty="0" err="1"/>
+              <a:t>Gogel</a:t>
+            </a:r>
+            <a:r>
+              <a:rPr lang="de-AT" dirty="0"/>
+              <a:t> </a:t>
+            </a:r>
+            <a:r>
+              <a:rPr lang="de-AT" dirty="0" err="1"/>
+              <a:t>and</a:t>
+            </a:r>
+            <a:r>
+              <a:rPr lang="de-AT" dirty="0"/>
+              <a:t> David Pfahler</a:t>
+            </a:r>
+            <a:endParaRPr lang="de-AT" dirty="0"/>
+          </a:p>
+        </p:txBody>
+      </p:sp>
+      <p:sp>
+        <p:nvSpPr>
+          <p:cNvPr id="6" name="Slide Number Placeholder 5"/>
+          <p:cNvSpPr>
+            <a:spLocks noGrp="1"/>
+          </p:cNvSpPr>
+          <p:nvPr>
+            <p:ph type="sldNum" sz="quarter" idx="11"/>
+          </p:nvPr>
+        </p:nvSpPr>
+        <p:spPr/>
+        <p:txBody>
+          <a:bodyPr/>
+          <a:lstStyle/>
+          <a:p>
+            <a:pPr>
+              <a:defRPr/>
+            </a:pPr>
+            <a:fld id="{63707275-EA33-4C2C-A96C-B80BEB93EE54}" type="slidenum">
+              <a:rPr lang="de-AT" smtClean="0"/>
+              <a:t>11</a:t>
+            </a:fld>
+            <a:endParaRPr lang="de-AT" dirty="0"/>
+          </a:p>
+        </p:txBody>
+      </p:sp>
+      <p:pic>
+        <p:nvPicPr>
+          <p:cNvPr id="9" name="Content Placeholder 8"/>
+          <p:cNvPicPr>
+            <a:picLocks noGrp="1" noChangeAspect="1"/>
+          </p:cNvPicPr>
+          <p:nvPr>
+            <p:ph sz="half" idx="1"/>
+          </p:nvPr>
+        </p:nvPicPr>
+        <p:blipFill>
+          <a:blip r:embed="rId3">
+            <a:extLst>
+              <a:ext uri="{28A0092B-C50C-407E-A947-70E740481C1C}">
+                <a14:useLocalDpi xmlns:a14="http://schemas.microsoft.com/office/drawing/2010/main" val="0"/>
+              </a:ext>
+            </a:extLst>
+          </a:blip>
+          <a:stretch>
+            <a:fillRect/>
+          </a:stretch>
+        </p:blipFill>
+        <p:spPr>
+          <a:xfrm>
+            <a:off x="899283" y="1336675"/>
+            <a:ext cx="2911547" cy="4591050"/>
+          </a:xfrm>
+        </p:spPr>
+      </p:pic>
+    </p:spTree>
+    <p:extLst>
+      <p:ext uri="{BB962C8B-B14F-4D97-AF65-F5344CB8AC3E}">
+        <p14:creationId xmlns:p14="http://schemas.microsoft.com/office/powerpoint/2010/main" val="3773070277"/>
+      </p:ext>
+    </p:extLst>
+  </p:cSld>
+  <p:clrMapOvr>
+    <a:masterClrMapping/>
+  </p:clrMapOvr>
+</p:sld>
+</file>
+
+<file path=ppt/slides/slide12.xml><?xml version="1.0" encoding="utf-8"?>
+<p:sld xmlns:a="http://schemas.openxmlformats.org/drawingml/2006/main" xmlns:r="http://schemas.openxmlformats.org/officeDocument/2006/relationships" xmlns:p="http://schemas.openxmlformats.org/presentationml/2006/main">
+  <p:cSld>
+    <p:spTree>
+      <p:nvGrpSpPr>
+        <p:cNvPr id="1" name=""/>
+        <p:cNvGrpSpPr/>
+        <p:nvPr/>
+      </p:nvGrpSpPr>
+      <p:grpSpPr>
+        <a:xfrm>
+          <a:off x="0" y="0"/>
+          <a:ext cx="0" cy="0"/>
+          <a:chOff x="0" y="0"/>
+          <a:chExt cx="0" cy="0"/>
+        </a:xfrm>
+      </p:grpSpPr>
+      <p:sp>
+        <p:nvSpPr>
+          <p:cNvPr id="2" name="Title 1"/>
+          <p:cNvSpPr>
+            <a:spLocks noGrp="1"/>
+          </p:cNvSpPr>
+          <p:nvPr>
+            <p:ph type="title"/>
+          </p:nvPr>
+        </p:nvSpPr>
+        <p:spPr>
+          <a:xfrm>
+            <a:off x="467544" y="0"/>
+            <a:ext cx="7761287" cy="757238"/>
+          </a:xfrm>
+        </p:spPr>
+        <p:txBody>
+          <a:bodyPr/>
+          <a:lstStyle/>
+          <a:p>
+            <a:r>
+              <a:rPr lang="en-US" dirty="0" smtClean="0"/>
+              <a:t>DVR</a:t>
+            </a:r>
+            <a:endParaRPr lang="en-US" dirty="0"/>
+          </a:p>
+        </p:txBody>
+      </p:sp>
+      <p:sp>
+        <p:nvSpPr>
+          <p:cNvPr id="5" name="Footer Placeholder 4"/>
+          <p:cNvSpPr>
+            <a:spLocks noGrp="1"/>
+          </p:cNvSpPr>
+          <p:nvPr>
+            <p:ph type="ftr" sz="quarter" idx="10"/>
+          </p:nvPr>
+        </p:nvSpPr>
+        <p:spPr/>
+        <p:txBody>
+          <a:bodyPr/>
+          <a:lstStyle/>
+          <a:p>
+            <a:pPr>
+              <a:defRPr/>
+            </a:pPr>
+            <a:r>
+              <a:rPr lang="de-AT" dirty="0"/>
+              <a:t>Andreas </a:t>
+            </a:r>
+            <a:r>
+              <a:rPr lang="de-AT" dirty="0" err="1"/>
+              <a:t>Gogel</a:t>
+            </a:r>
+            <a:r>
+              <a:rPr lang="de-AT" dirty="0"/>
+              <a:t> </a:t>
+            </a:r>
+            <a:r>
+              <a:rPr lang="de-AT" dirty="0" err="1"/>
+              <a:t>and</a:t>
+            </a:r>
+            <a:r>
+              <a:rPr lang="de-AT" dirty="0"/>
+              <a:t> David Pfahler</a:t>
+            </a:r>
+            <a:endParaRPr lang="de-AT" dirty="0"/>
+          </a:p>
+        </p:txBody>
+      </p:sp>
+      <p:sp>
+        <p:nvSpPr>
+          <p:cNvPr id="6" name="Slide Number Placeholder 5"/>
+          <p:cNvSpPr>
+            <a:spLocks noGrp="1"/>
+          </p:cNvSpPr>
+          <p:nvPr>
+            <p:ph type="sldNum" sz="quarter" idx="11"/>
+          </p:nvPr>
+        </p:nvSpPr>
+        <p:spPr/>
+        <p:txBody>
+          <a:bodyPr/>
+          <a:lstStyle/>
+          <a:p>
+            <a:pPr>
+              <a:defRPr/>
+            </a:pPr>
+            <a:fld id="{63707275-EA33-4C2C-A96C-B80BEB93EE54}" type="slidenum">
+              <a:rPr lang="de-AT" smtClean="0"/>
+              <a:t>12</a:t>
+            </a:fld>
+            <a:endParaRPr lang="de-AT" dirty="0"/>
+          </a:p>
+        </p:txBody>
+      </p:sp>
+      <p:sp>
+        <p:nvSpPr>
+          <p:cNvPr id="7" name="Content Placeholder 6"/>
+          <p:cNvSpPr>
+            <a:spLocks noGrp="1"/>
+          </p:cNvSpPr>
+          <p:nvPr>
+            <p:ph sz="half" idx="1"/>
+          </p:nvPr>
+        </p:nvSpPr>
+        <p:spPr/>
+        <p:txBody>
+          <a:bodyPr/>
+          <a:lstStyle/>
+          <a:p>
+            <a:r>
+              <a:rPr lang="en-US" dirty="0" smtClean="0"/>
+              <a:t>Great Visualization Tool </a:t>
+            </a:r>
+            <a:r>
+              <a:rPr lang="en-US" b="1" dirty="0" smtClean="0"/>
+              <a:t>BUT</a:t>
+            </a:r>
+            <a:r>
+              <a:rPr lang="en-US" dirty="0" smtClean="0"/>
+              <a:t>:</a:t>
+            </a:r>
+          </a:p>
+          <a:p>
+            <a:pPr lvl="1"/>
+            <a:r>
+              <a:rPr lang="en-US" dirty="0" smtClean="0"/>
+              <a:t>Hard to get it running on windows.</a:t>
+            </a:r>
+          </a:p>
+          <a:p>
+            <a:pPr lvl="1"/>
+            <a:r>
+              <a:rPr lang="en-US" dirty="0" smtClean="0"/>
+              <a:t>Hard to implement abstract classes</a:t>
+            </a:r>
+          </a:p>
+          <a:p>
+            <a:pPr lvl="1"/>
+            <a:r>
+              <a:rPr lang="en-US" dirty="0" smtClean="0"/>
+              <a:t>Hard to connect with QT</a:t>
+            </a:r>
+          </a:p>
+          <a:p>
+            <a:pPr lvl="1"/>
+            <a:endParaRPr lang="en-US" dirty="0"/>
+          </a:p>
+        </p:txBody>
+      </p:sp>
+      <p:pic>
+        <p:nvPicPr>
+          <p:cNvPr id="11" name="Content Placeholder 10"/>
+          <p:cNvPicPr>
+            <a:picLocks noGrp="1" noChangeAspect="1"/>
+          </p:cNvPicPr>
+          <p:nvPr>
+            <p:ph sz="half" idx="2"/>
+          </p:nvPr>
+        </p:nvPicPr>
+        <p:blipFill>
+          <a:blip r:embed="rId2" cstate="print">
+            <a:extLst>
+              <a:ext uri="{28A0092B-C50C-407E-A947-70E740481C1C}">
+                <a14:useLocalDpi xmlns:a14="http://schemas.microsoft.com/office/drawing/2010/main" val="0"/>
+              </a:ext>
+            </a:extLst>
+          </a:blip>
+          <a:stretch>
+            <a:fillRect/>
+          </a:stretch>
+        </p:blipFill>
+        <p:spPr>
+          <a:xfrm>
+            <a:off x="4683125" y="1860201"/>
+            <a:ext cx="4352925" cy="3569398"/>
+          </a:xfrm>
+        </p:spPr>
+      </p:pic>
+    </p:spTree>
+    <p:extLst>
+      <p:ext uri="{BB962C8B-B14F-4D97-AF65-F5344CB8AC3E}">
+        <p14:creationId xmlns:p14="http://schemas.microsoft.com/office/powerpoint/2010/main" val="2263994035"/>
+      </p:ext>
+    </p:extLst>
+  </p:cSld>
+  <p:clrMapOvr>
+    <a:masterClrMapping/>
+  </p:clrMapOvr>
+</p:sld>
+</file>
+
+<file path=ppt/slides/slide13.xml><?xml version="1.0" encoding="utf-8"?>
+<p:sld xmlns:a="http://schemas.openxmlformats.org/drawingml/2006/main" xmlns:r="http://schemas.openxmlformats.org/officeDocument/2006/relationships" xmlns:p="http://schemas.openxmlformats.org/presentationml/2006/main">
+  <p:cSld>
+    <p:spTree>
+      <p:nvGrpSpPr>
+        <p:cNvPr id="1" name=""/>
+        <p:cNvGrpSpPr/>
+        <p:nvPr/>
+      </p:nvGrpSpPr>
+      <p:grpSpPr>
+        <a:xfrm>
+          <a:off x="0" y="0"/>
+          <a:ext cx="0" cy="0"/>
+          <a:chOff x="0" y="0"/>
+          <a:chExt cx="0" cy="0"/>
+        </a:xfrm>
+      </p:grpSpPr>
+      <p:sp>
+        <p:nvSpPr>
+          <p:cNvPr id="2" name="Title 1"/>
+          <p:cNvSpPr>
+            <a:spLocks noGrp="1"/>
+          </p:cNvSpPr>
+          <p:nvPr>
+            <p:ph type="title"/>
+          </p:nvPr>
+        </p:nvSpPr>
+        <p:spPr>
+          <a:xfrm>
+            <a:off x="467544" y="0"/>
+            <a:ext cx="7761287" cy="757238"/>
+          </a:xfrm>
+        </p:spPr>
+        <p:txBody>
+          <a:bodyPr/>
+          <a:lstStyle/>
+          <a:p>
+            <a:r>
+              <a:rPr lang="en-US" dirty="0" smtClean="0"/>
+              <a:t>DVR</a:t>
+            </a:r>
+            <a:endParaRPr lang="en-US" dirty="0"/>
+          </a:p>
+        </p:txBody>
+      </p:sp>
+      <p:sp>
+        <p:nvSpPr>
+          <p:cNvPr id="5" name="Footer Placeholder 4"/>
+          <p:cNvSpPr>
+            <a:spLocks noGrp="1"/>
+          </p:cNvSpPr>
+          <p:nvPr>
+            <p:ph type="ftr" sz="quarter" idx="10"/>
+          </p:nvPr>
+        </p:nvSpPr>
+        <p:spPr/>
+        <p:txBody>
+          <a:bodyPr/>
+          <a:lstStyle/>
+          <a:p>
+            <a:pPr>
+              <a:defRPr/>
+            </a:pPr>
+            <a:r>
+              <a:rPr lang="de-AT" dirty="0"/>
+              <a:t>Andreas </a:t>
+            </a:r>
+            <a:r>
+              <a:rPr lang="de-AT" dirty="0" err="1"/>
+              <a:t>Gogel</a:t>
+            </a:r>
+            <a:r>
+              <a:rPr lang="de-AT" dirty="0"/>
+              <a:t> </a:t>
+            </a:r>
+            <a:r>
+              <a:rPr lang="de-AT" dirty="0" err="1"/>
+              <a:t>and</a:t>
+            </a:r>
+            <a:r>
+              <a:rPr lang="de-AT" dirty="0"/>
+              <a:t> David Pfahler</a:t>
+            </a:r>
+            <a:endParaRPr lang="de-AT" dirty="0"/>
+          </a:p>
+        </p:txBody>
+      </p:sp>
+      <p:sp>
+        <p:nvSpPr>
+          <p:cNvPr id="6" name="Slide Number Placeholder 5"/>
+          <p:cNvSpPr>
+            <a:spLocks noGrp="1"/>
+          </p:cNvSpPr>
+          <p:nvPr>
+            <p:ph type="sldNum" sz="quarter" idx="11"/>
+          </p:nvPr>
+        </p:nvSpPr>
+        <p:spPr/>
+        <p:txBody>
+          <a:bodyPr/>
+          <a:lstStyle/>
+          <a:p>
+            <a:pPr>
+              <a:defRPr/>
+            </a:pPr>
+            <a:fld id="{63707275-EA33-4C2C-A96C-B80BEB93EE54}" type="slidenum">
+              <a:rPr lang="de-AT" smtClean="0"/>
+              <a:t>13</a:t>
+            </a:fld>
+            <a:endParaRPr lang="de-AT" dirty="0"/>
+          </a:p>
+        </p:txBody>
+      </p:sp>
+      <p:sp>
+        <p:nvSpPr>
+          <p:cNvPr id="7" name="Content Placeholder 6"/>
+          <p:cNvSpPr>
+            <a:spLocks noGrp="1"/>
+          </p:cNvSpPr>
+          <p:nvPr>
+            <p:ph sz="half" idx="1"/>
+          </p:nvPr>
+        </p:nvSpPr>
+        <p:spPr/>
+        <p:txBody>
+          <a:bodyPr/>
+          <a:lstStyle/>
+          <a:p>
+            <a:r>
+              <a:rPr lang="en-US" dirty="0" smtClean="0"/>
+              <a:t>Lessons Learned:</a:t>
+            </a:r>
+          </a:p>
+          <a:p>
+            <a:pPr lvl="1"/>
+            <a:r>
+              <a:rPr lang="en-US" dirty="0" smtClean="0"/>
+              <a:t>Great piece of software</a:t>
+            </a:r>
+          </a:p>
+          <a:p>
+            <a:pPr lvl="1"/>
+            <a:r>
+              <a:rPr lang="en-US" dirty="0" smtClean="0"/>
+              <a:t>very easy to fulfill easy task</a:t>
+            </a:r>
+          </a:p>
+          <a:p>
+            <a:pPr lvl="1"/>
+            <a:r>
+              <a:rPr lang="en-US" dirty="0" smtClean="0"/>
+              <a:t>Don’t try to add or change something.</a:t>
+            </a:r>
+          </a:p>
+          <a:p>
+            <a:pPr lvl="1"/>
+            <a:r>
+              <a:rPr lang="en-US" dirty="0"/>
+              <a:t>I</a:t>
+            </a:r>
+            <a:r>
+              <a:rPr lang="en-US" dirty="0" smtClean="0"/>
+              <a:t>t is already somewhere and you just have to find and include it.</a:t>
+            </a:r>
+          </a:p>
+          <a:p>
+            <a:pPr lvl="1"/>
+            <a:endParaRPr lang="en-US" dirty="0"/>
+          </a:p>
+        </p:txBody>
+      </p:sp>
+      <p:pic>
+        <p:nvPicPr>
+          <p:cNvPr id="11" name="Content Placeholder 10"/>
+          <p:cNvPicPr>
+            <a:picLocks noGrp="1" noChangeAspect="1"/>
+          </p:cNvPicPr>
+          <p:nvPr>
+            <p:ph sz="half" idx="2"/>
+          </p:nvPr>
+        </p:nvPicPr>
+        <p:blipFill>
+          <a:blip r:embed="rId2" cstate="print">
+            <a:extLst>
+              <a:ext uri="{28A0092B-C50C-407E-A947-70E740481C1C}">
+                <a14:useLocalDpi xmlns:a14="http://schemas.microsoft.com/office/drawing/2010/main" val="0"/>
+              </a:ext>
+            </a:extLst>
+          </a:blip>
+          <a:stretch>
+            <a:fillRect/>
+          </a:stretch>
+        </p:blipFill>
+        <p:spPr>
+          <a:xfrm>
+            <a:off x="4683125" y="1860201"/>
+            <a:ext cx="4352925" cy="3569398"/>
+          </a:xfrm>
+        </p:spPr>
+      </p:pic>
+    </p:spTree>
+    <p:extLst>
+      <p:ext uri="{BB962C8B-B14F-4D97-AF65-F5344CB8AC3E}">
+        <p14:creationId xmlns:p14="http://schemas.microsoft.com/office/powerpoint/2010/main" val="2611260474"/>
+      </p:ext>
+    </p:extLst>
+  </p:cSld>
+  <p:clrMapOvr>
+    <a:masterClrMapping/>
+  </p:clrMapOvr>
+</p:sld>
+</file>
+
 <file path=ppt/slides/slide2.xml><?xml version="1.0" encoding="utf-8"?>
+<p:sld xmlns:a="http://schemas.openxmlformats.org/drawingml/2006/main" xmlns:r="http://schemas.openxmlformats.org/officeDocument/2006/relationships" xmlns:p="http://schemas.openxmlformats.org/presentationml/2006/main">
+  <p:cSld>
+    <p:spTree>
+      <p:nvGrpSpPr>
+        <p:cNvPr id="1" name=""/>
+        <p:cNvGrpSpPr/>
+        <p:nvPr/>
+      </p:nvGrpSpPr>
+      <p:grpSpPr>
+        <a:xfrm>
+          <a:off x="0" y="0"/>
+          <a:ext cx="0" cy="0"/>
+          <a:chOff x="0" y="0"/>
+          <a:chExt cx="0" cy="0"/>
+        </a:xfrm>
+      </p:grpSpPr>
+      <p:sp>
+        <p:nvSpPr>
+          <p:cNvPr id="2" name="Title 1"/>
+          <p:cNvSpPr>
+            <a:spLocks noGrp="1"/>
+          </p:cNvSpPr>
+          <p:nvPr>
+            <p:ph type="title"/>
+          </p:nvPr>
+        </p:nvSpPr>
+        <p:spPr/>
+        <p:txBody>
+          <a:bodyPr/>
+          <a:lstStyle/>
+          <a:p>
+            <a:r>
+              <a:rPr lang="en-US" dirty="0" smtClean="0"/>
+              <a:t>Outline</a:t>
+            </a:r>
+            <a:endParaRPr lang="de-AT" dirty="0"/>
+          </a:p>
+        </p:txBody>
+      </p:sp>
+      <p:sp>
+        <p:nvSpPr>
+          <p:cNvPr id="4" name="Footer Placeholder 3"/>
+          <p:cNvSpPr>
+            <a:spLocks noGrp="1"/>
+          </p:cNvSpPr>
+          <p:nvPr>
+            <p:ph type="ftr" sz="quarter" idx="10"/>
+          </p:nvPr>
+        </p:nvSpPr>
+        <p:spPr/>
+        <p:txBody>
+          <a:bodyPr/>
+          <a:lstStyle/>
+          <a:p>
+            <a:pPr>
+              <a:defRPr/>
+            </a:pPr>
+            <a:r>
+              <a:rPr lang="de-AT" dirty="0" smtClean="0"/>
+              <a:t>Andreas </a:t>
+            </a:r>
+            <a:r>
+              <a:rPr lang="de-AT" dirty="0" err="1" smtClean="0"/>
+              <a:t>Gogel</a:t>
+            </a:r>
+            <a:r>
+              <a:rPr lang="de-AT" dirty="0" smtClean="0"/>
+              <a:t> </a:t>
+            </a:r>
+            <a:r>
+              <a:rPr lang="de-AT" dirty="0" err="1" smtClean="0"/>
+              <a:t>and</a:t>
+            </a:r>
+            <a:r>
+              <a:rPr lang="de-AT" dirty="0" smtClean="0"/>
+              <a:t> David Pfahler</a:t>
+            </a:r>
+            <a:endParaRPr lang="de-AT" dirty="0"/>
+          </a:p>
+        </p:txBody>
+      </p:sp>
+      <p:sp>
+        <p:nvSpPr>
+          <p:cNvPr id="5" name="Slide Number Placeholder 4"/>
+          <p:cNvSpPr>
+            <a:spLocks noGrp="1"/>
+          </p:cNvSpPr>
+          <p:nvPr>
+            <p:ph type="sldNum" sz="quarter" idx="11"/>
+          </p:nvPr>
+        </p:nvSpPr>
+        <p:spPr/>
+        <p:txBody>
+          <a:bodyPr/>
+          <a:lstStyle/>
+          <a:p>
+            <a:pPr>
+              <a:defRPr/>
+            </a:pPr>
+            <a:fld id="{63707275-EA33-4C2C-A96C-B80BEB93EE54}" type="slidenum">
+              <a:rPr lang="de-AT" smtClean="0"/>
+              <a:t>2</a:t>
+            </a:fld>
+            <a:endParaRPr lang="de-AT" dirty="0"/>
+          </a:p>
+        </p:txBody>
+      </p:sp>
+      <p:sp>
+        <p:nvSpPr>
+          <p:cNvPr id="6" name="Content Placeholder 5"/>
+          <p:cNvSpPr>
+            <a:spLocks noGrp="1"/>
+          </p:cNvSpPr>
+          <p:nvPr>
+            <p:ph sz="half" idx="1"/>
+          </p:nvPr>
+        </p:nvSpPr>
+        <p:spPr/>
+        <p:txBody>
+          <a:bodyPr/>
+          <a:lstStyle/>
+          <a:p>
+            <a:r>
+              <a:rPr lang="en-US" dirty="0" smtClean="0"/>
+              <a:t>Transfer Function</a:t>
+            </a:r>
+          </a:p>
+          <a:p>
+            <a:pPr lvl="1"/>
+            <a:r>
+              <a:rPr lang="en-US" dirty="0" err="1" smtClean="0"/>
+              <a:t>Qt</a:t>
+            </a:r>
+            <a:r>
+              <a:rPr lang="en-US" dirty="0"/>
+              <a:t> </a:t>
+            </a:r>
+            <a:r>
+              <a:rPr lang="en-US" dirty="0" smtClean="0"/>
+              <a:t>Widget</a:t>
+            </a:r>
+          </a:p>
+          <a:p>
+            <a:r>
+              <a:rPr lang="en-US" dirty="0" smtClean="0"/>
+              <a:t>Filter</a:t>
+            </a:r>
+          </a:p>
+          <a:p>
+            <a:pPr lvl="1"/>
+            <a:r>
+              <a:rPr lang="en-US" dirty="0" smtClean="0"/>
+              <a:t>Gaussian</a:t>
+            </a:r>
+          </a:p>
+          <a:p>
+            <a:pPr lvl="1"/>
+            <a:r>
+              <a:rPr lang="en-US" dirty="0" smtClean="0"/>
+              <a:t>Bilateral</a:t>
+            </a:r>
+          </a:p>
+          <a:p>
+            <a:pPr lvl="1"/>
+            <a:r>
+              <a:rPr lang="en-US" dirty="0" smtClean="0"/>
+              <a:t>Median</a:t>
+            </a:r>
+          </a:p>
+          <a:p>
+            <a:pPr lvl="1"/>
+            <a:r>
+              <a:rPr lang="en-US" dirty="0" smtClean="0"/>
+              <a:t>Gradient</a:t>
+            </a:r>
+          </a:p>
+          <a:p>
+            <a:r>
+              <a:rPr lang="en-US" dirty="0" smtClean="0"/>
+              <a:t>Direct Volume Rendering</a:t>
+            </a:r>
+          </a:p>
+          <a:p>
+            <a:pPr lvl="1"/>
+            <a:r>
+              <a:rPr lang="en-US" dirty="0" smtClean="0"/>
+              <a:t>VTK</a:t>
+            </a:r>
+          </a:p>
+          <a:p>
+            <a:pPr lvl="1"/>
+            <a:r>
+              <a:rPr lang="en-US" dirty="0" smtClean="0"/>
+              <a:t>OpenGL</a:t>
+            </a:r>
+          </a:p>
+          <a:p>
+            <a:pPr lvl="2"/>
+            <a:endParaRPr lang="en-US" dirty="0"/>
+          </a:p>
+        </p:txBody>
+      </p:sp>
+      <p:pic>
+        <p:nvPicPr>
+          <p:cNvPr id="10" name="Content Placeholder 9"/>
+          <p:cNvPicPr>
+            <a:picLocks noGrp="1" noChangeAspect="1"/>
+          </p:cNvPicPr>
+          <p:nvPr>
+            <p:ph sz="half" idx="2"/>
+          </p:nvPr>
+        </p:nvPicPr>
+        <p:blipFill>
+          <a:blip r:embed="rId2" cstate="print">
+            <a:extLst>
+              <a:ext uri="{28A0092B-C50C-407E-A947-70E740481C1C}">
+                <a14:useLocalDpi xmlns:a14="http://schemas.microsoft.com/office/drawing/2010/main" val="0"/>
+              </a:ext>
+            </a:extLst>
+          </a:blip>
+          <a:stretch>
+            <a:fillRect/>
+          </a:stretch>
+        </p:blipFill>
+        <p:spPr>
+          <a:xfrm>
+            <a:off x="4683125" y="1362719"/>
+            <a:ext cx="4352925" cy="4564362"/>
+          </a:xfrm>
+        </p:spPr>
+      </p:pic>
+    </p:spTree>
+    <p:extLst>
+      <p:ext uri="{BB962C8B-B14F-4D97-AF65-F5344CB8AC3E}">
+        <p14:creationId xmlns:p14="http://schemas.microsoft.com/office/powerpoint/2010/main" val="905430360"/>
+      </p:ext>
+    </p:extLst>
+  </p:cSld>
+  <p:clrMapOvr>
+    <a:masterClrMapping/>
+  </p:clrMapOvr>
+  <p:timing>
+    <p:tnLst>
+      <p:par>
+        <p:cTn id="1" dur="indefinite" restart="never" nodeType="tmRoot"/>
+      </p:par>
+    </p:tnLst>
+  </p:timing>
+</p:sld>
+</file>
+
+<file path=ppt/slides/slide3.xml><?xml version="1.0" encoding="utf-8"?>
 <p:sld xmlns:a="http://schemas.openxmlformats.org/drawingml/2006/main" xmlns:r="http://schemas.openxmlformats.org/officeDocument/2006/relationships" xmlns:p="http://schemas.openxmlformats.org/presentationml/2006/main">
   <p:cSld>
     <p:spTree>
@@ -19628,7 +20677,7 @@
             </a:pPr>
             <a:fld id="{63707275-EA33-4C2C-A96C-B80BEB93EE54}" type="slidenum">
               <a:rPr lang="de-AT" smtClean="0"/>
-              <a:t>2</a:t>
+              <a:t>3</a:t>
             </a:fld>
             <a:endParaRPr lang="de-AT" dirty="0"/>
           </a:p>
@@ -19637,7 +20686,7 @@
     </p:spTree>
     <p:extLst>
       <p:ext uri="{BB962C8B-B14F-4D97-AF65-F5344CB8AC3E}">
-        <p14:creationId xmlns:p14="http://schemas.microsoft.com/office/powerpoint/2010/main" val="905430360"/>
+        <p14:creationId xmlns:p14="http://schemas.microsoft.com/office/powerpoint/2010/main" val="958570043"/>
       </p:ext>
     </p:extLst>
   </p:cSld>
@@ -19654,7 +20703,7 @@
 </p:sld>
 </file>
 
-<file path=ppt/slides/slide3.xml><?xml version="1.0" encoding="utf-8"?>
+<file path=ppt/slides/slide4.xml><?xml version="1.0" encoding="utf-8"?>
 <p:sld xmlns:a="http://schemas.openxmlformats.org/drawingml/2006/main" xmlns:r="http://schemas.openxmlformats.org/officeDocument/2006/relationships" xmlns:p="http://schemas.openxmlformats.org/presentationml/2006/main">
   <p:cSld>
     <p:spTree>
@@ -19769,7 +20818,7 @@
             </a:pPr>
             <a:fld id="{63707275-EA33-4C2C-A96C-B80BEB93EE54}" type="slidenum">
               <a:rPr lang="de-AT" smtClean="0"/>
-              <a:t>3</a:t>
+              <a:t>4</a:t>
             </a:fld>
             <a:endParaRPr lang="de-AT" dirty="0"/>
           </a:p>
@@ -19821,6 +20870,859 @@
       </p:par>
     </p:tnLst>
   </p:timing>
+</p:sld>
+</file>
+
+<file path=ppt/slides/slide5.xml><?xml version="1.0" encoding="utf-8"?>
+<p:sld xmlns:a="http://schemas.openxmlformats.org/drawingml/2006/main" xmlns:r="http://schemas.openxmlformats.org/officeDocument/2006/relationships" xmlns:p="http://schemas.openxmlformats.org/presentationml/2006/main">
+  <p:cSld>
+    <p:spTree>
+      <p:nvGrpSpPr>
+        <p:cNvPr id="1" name=""/>
+        <p:cNvGrpSpPr/>
+        <p:nvPr/>
+      </p:nvGrpSpPr>
+      <p:grpSpPr>
+        <a:xfrm>
+          <a:off x="0" y="0"/>
+          <a:ext cx="0" cy="0"/>
+          <a:chOff x="0" y="0"/>
+          <a:chExt cx="0" cy="0"/>
+        </a:xfrm>
+      </p:grpSpPr>
+      <p:sp>
+        <p:nvSpPr>
+          <p:cNvPr id="2" name="Title 1"/>
+          <p:cNvSpPr>
+            <a:spLocks noGrp="1"/>
+          </p:cNvSpPr>
+          <p:nvPr>
+            <p:ph type="title"/>
+          </p:nvPr>
+        </p:nvSpPr>
+        <p:spPr/>
+        <p:txBody>
+          <a:bodyPr/>
+          <a:lstStyle/>
+          <a:p>
+            <a:r>
+              <a:rPr lang="en-US" dirty="0" smtClean="0"/>
+              <a:t>Transfer </a:t>
+            </a:r>
+            <a:r>
+              <a:rPr lang="en-US" dirty="0" smtClean="0"/>
+              <a:t>Function Widget</a:t>
+            </a:r>
+            <a:endParaRPr lang="de-AT" dirty="0"/>
+          </a:p>
+        </p:txBody>
+      </p:sp>
+      <p:sp>
+        <p:nvSpPr>
+          <p:cNvPr id="4" name="Footer Placeholder 3"/>
+          <p:cNvSpPr>
+            <a:spLocks noGrp="1"/>
+          </p:cNvSpPr>
+          <p:nvPr>
+            <p:ph type="ftr" sz="quarter" idx="10"/>
+          </p:nvPr>
+        </p:nvSpPr>
+        <p:spPr/>
+        <p:txBody>
+          <a:bodyPr/>
+          <a:lstStyle/>
+          <a:p>
+            <a:pPr>
+              <a:defRPr/>
+            </a:pPr>
+            <a:r>
+              <a:rPr lang="de-AT" smtClean="0"/>
+              <a:t>Andreas Gogel and David Pfahler</a:t>
+            </a:r>
+            <a:endParaRPr lang="de-AT" dirty="0"/>
+          </a:p>
+        </p:txBody>
+      </p:sp>
+      <p:sp>
+        <p:nvSpPr>
+          <p:cNvPr id="5" name="Slide Number Placeholder 4"/>
+          <p:cNvSpPr>
+            <a:spLocks noGrp="1"/>
+          </p:cNvSpPr>
+          <p:nvPr>
+            <p:ph type="sldNum" sz="quarter" idx="11"/>
+          </p:nvPr>
+        </p:nvSpPr>
+        <p:spPr/>
+        <p:txBody>
+          <a:bodyPr/>
+          <a:lstStyle/>
+          <a:p>
+            <a:pPr>
+              <a:defRPr/>
+            </a:pPr>
+            <a:fld id="{63707275-EA33-4C2C-A96C-B80BEB93EE54}" type="slidenum">
+              <a:rPr lang="de-AT" smtClean="0"/>
+              <a:t>5</a:t>
+            </a:fld>
+            <a:endParaRPr lang="de-AT" dirty="0"/>
+          </a:p>
+        </p:txBody>
+      </p:sp>
+      <p:sp>
+        <p:nvSpPr>
+          <p:cNvPr id="8" name="Content Placeholder 7"/>
+          <p:cNvSpPr>
+            <a:spLocks noGrp="1"/>
+          </p:cNvSpPr>
+          <p:nvPr>
+            <p:ph sz="half" idx="1"/>
+          </p:nvPr>
+        </p:nvSpPr>
+        <p:spPr/>
+        <p:txBody>
+          <a:bodyPr/>
+          <a:lstStyle/>
+          <a:p>
+            <a:r>
+              <a:rPr lang="en-US" dirty="0" smtClean="0"/>
+              <a:t>TODO Add TF Widget image</a:t>
+            </a:r>
+            <a:endParaRPr lang="en-US" dirty="0"/>
+          </a:p>
+        </p:txBody>
+      </p:sp>
+      <p:pic>
+        <p:nvPicPr>
+          <p:cNvPr id="11" name="Content Placeholder 10"/>
+          <p:cNvPicPr>
+            <a:picLocks noGrp="1" noChangeAspect="1"/>
+          </p:cNvPicPr>
+          <p:nvPr>
+            <p:ph sz="half" idx="2"/>
+          </p:nvPr>
+        </p:nvPicPr>
+        <p:blipFill>
+          <a:blip r:embed="rId2">
+            <a:extLst>
+              <a:ext uri="{28A0092B-C50C-407E-A947-70E740481C1C}">
+                <a14:useLocalDpi xmlns:a14="http://schemas.microsoft.com/office/drawing/2010/main" val="0"/>
+              </a:ext>
+            </a:extLst>
+          </a:blip>
+          <a:stretch>
+            <a:fillRect/>
+          </a:stretch>
+        </p:blipFill>
+        <p:spPr>
+          <a:xfrm>
+            <a:off x="4683125" y="1217609"/>
+            <a:ext cx="4352925" cy="4854582"/>
+          </a:xfrm>
+        </p:spPr>
+      </p:pic>
+    </p:spTree>
+    <p:extLst>
+      <p:ext uri="{BB962C8B-B14F-4D97-AF65-F5344CB8AC3E}">
+        <p14:creationId xmlns:p14="http://schemas.microsoft.com/office/powerpoint/2010/main" val="3099875465"/>
+      </p:ext>
+    </p:extLst>
+  </p:cSld>
+  <p:clrMapOvr>
+    <a:masterClrMapping/>
+  </p:clrMapOvr>
+  <p:timing>
+    <p:tnLst>
+      <p:par>
+        <p:cTn id="1" dur="indefinite" restart="never" nodeType="tmRoot"/>
+      </p:par>
+    </p:tnLst>
+  </p:timing>
+</p:sld>
+</file>
+
+<file path=ppt/slides/slide6.xml><?xml version="1.0" encoding="utf-8"?>
+<p:sld xmlns:a="http://schemas.openxmlformats.org/drawingml/2006/main" xmlns:r="http://schemas.openxmlformats.org/officeDocument/2006/relationships" xmlns:p="http://schemas.openxmlformats.org/presentationml/2006/main">
+  <p:cSld>
+    <p:spTree>
+      <p:nvGrpSpPr>
+        <p:cNvPr id="1" name=""/>
+        <p:cNvGrpSpPr/>
+        <p:nvPr/>
+      </p:nvGrpSpPr>
+      <p:grpSpPr>
+        <a:xfrm>
+          <a:off x="0" y="0"/>
+          <a:ext cx="0" cy="0"/>
+          <a:chOff x="0" y="0"/>
+          <a:chExt cx="0" cy="0"/>
+        </a:xfrm>
+      </p:grpSpPr>
+      <p:sp>
+        <p:nvSpPr>
+          <p:cNvPr id="2" name="Title 1"/>
+          <p:cNvSpPr>
+            <a:spLocks noGrp="1"/>
+          </p:cNvSpPr>
+          <p:nvPr>
+            <p:ph type="title"/>
+          </p:nvPr>
+        </p:nvSpPr>
+        <p:spPr/>
+        <p:txBody>
+          <a:bodyPr/>
+          <a:lstStyle/>
+          <a:p>
+            <a:r>
+              <a:rPr lang="en-US" dirty="0" smtClean="0"/>
+              <a:t>Filter</a:t>
+            </a:r>
+            <a:endParaRPr lang="en-US" dirty="0"/>
+          </a:p>
+        </p:txBody>
+      </p:sp>
+      <p:sp>
+        <p:nvSpPr>
+          <p:cNvPr id="3" name="Content Placeholder 2"/>
+          <p:cNvSpPr>
+            <a:spLocks noGrp="1"/>
+          </p:cNvSpPr>
+          <p:nvPr>
+            <p:ph sz="half" idx="1"/>
+          </p:nvPr>
+        </p:nvSpPr>
+        <p:spPr/>
+        <p:txBody>
+          <a:bodyPr/>
+          <a:lstStyle/>
+          <a:p>
+            <a:r>
+              <a:rPr lang="en-US" dirty="0" smtClean="0"/>
+              <a:t>TODO add 4 filter images as teaser</a:t>
+            </a:r>
+            <a:endParaRPr lang="en-US" dirty="0"/>
+          </a:p>
+        </p:txBody>
+      </p:sp>
+      <p:sp>
+        <p:nvSpPr>
+          <p:cNvPr id="4" name="Content Placeholder 3"/>
+          <p:cNvSpPr>
+            <a:spLocks noGrp="1"/>
+          </p:cNvSpPr>
+          <p:nvPr>
+            <p:ph sz="half" idx="2"/>
+          </p:nvPr>
+        </p:nvSpPr>
+        <p:spPr/>
+        <p:txBody>
+          <a:bodyPr/>
+          <a:lstStyle/>
+          <a:p>
+            <a:endParaRPr lang="en-US"/>
+          </a:p>
+        </p:txBody>
+      </p:sp>
+      <p:sp>
+        <p:nvSpPr>
+          <p:cNvPr id="5" name="Footer Placeholder 4"/>
+          <p:cNvSpPr>
+            <a:spLocks noGrp="1"/>
+          </p:cNvSpPr>
+          <p:nvPr>
+            <p:ph type="ftr" sz="quarter" idx="10"/>
+          </p:nvPr>
+        </p:nvSpPr>
+        <p:spPr/>
+        <p:txBody>
+          <a:bodyPr/>
+          <a:lstStyle/>
+          <a:p>
+            <a:pPr>
+              <a:defRPr/>
+            </a:pPr>
+            <a:r>
+              <a:rPr lang="de-AT" dirty="0"/>
+              <a:t>Andreas </a:t>
+            </a:r>
+            <a:r>
+              <a:rPr lang="de-AT" dirty="0" err="1"/>
+              <a:t>Gogel</a:t>
+            </a:r>
+            <a:r>
+              <a:rPr lang="de-AT" dirty="0"/>
+              <a:t> </a:t>
+            </a:r>
+            <a:r>
+              <a:rPr lang="de-AT" dirty="0" err="1"/>
+              <a:t>and</a:t>
+            </a:r>
+            <a:r>
+              <a:rPr lang="de-AT" dirty="0"/>
+              <a:t> David Pfahler</a:t>
+            </a:r>
+            <a:endParaRPr lang="de-AT" dirty="0"/>
+          </a:p>
+        </p:txBody>
+      </p:sp>
+      <p:sp>
+        <p:nvSpPr>
+          <p:cNvPr id="6" name="Slide Number Placeholder 5"/>
+          <p:cNvSpPr>
+            <a:spLocks noGrp="1"/>
+          </p:cNvSpPr>
+          <p:nvPr>
+            <p:ph type="sldNum" sz="quarter" idx="11"/>
+          </p:nvPr>
+        </p:nvSpPr>
+        <p:spPr/>
+        <p:txBody>
+          <a:bodyPr/>
+          <a:lstStyle/>
+          <a:p>
+            <a:pPr>
+              <a:defRPr/>
+            </a:pPr>
+            <a:fld id="{63707275-EA33-4C2C-A96C-B80BEB93EE54}" type="slidenum">
+              <a:rPr lang="de-AT" smtClean="0"/>
+              <a:t>6</a:t>
+            </a:fld>
+            <a:endParaRPr lang="de-AT" dirty="0"/>
+          </a:p>
+        </p:txBody>
+      </p:sp>
+    </p:spTree>
+    <p:extLst>
+      <p:ext uri="{BB962C8B-B14F-4D97-AF65-F5344CB8AC3E}">
+        <p14:creationId xmlns:p14="http://schemas.microsoft.com/office/powerpoint/2010/main" val="3616828298"/>
+      </p:ext>
+    </p:extLst>
+  </p:cSld>
+  <p:clrMapOvr>
+    <a:masterClrMapping/>
+  </p:clrMapOvr>
+</p:sld>
+</file>
+
+<file path=ppt/slides/slide7.xml><?xml version="1.0" encoding="utf-8"?>
+<p:sld xmlns:a="http://schemas.openxmlformats.org/drawingml/2006/main" xmlns:r="http://schemas.openxmlformats.org/officeDocument/2006/relationships" xmlns:p="http://schemas.openxmlformats.org/presentationml/2006/main">
+  <p:cSld>
+    <p:spTree>
+      <p:nvGrpSpPr>
+        <p:cNvPr id="1" name=""/>
+        <p:cNvGrpSpPr/>
+        <p:nvPr/>
+      </p:nvGrpSpPr>
+      <p:grpSpPr>
+        <a:xfrm>
+          <a:off x="0" y="0"/>
+          <a:ext cx="0" cy="0"/>
+          <a:chOff x="0" y="0"/>
+          <a:chExt cx="0" cy="0"/>
+        </a:xfrm>
+      </p:grpSpPr>
+      <p:sp>
+        <p:nvSpPr>
+          <p:cNvPr id="2" name="Title 1"/>
+          <p:cNvSpPr>
+            <a:spLocks noGrp="1"/>
+          </p:cNvSpPr>
+          <p:nvPr>
+            <p:ph type="title"/>
+          </p:nvPr>
+        </p:nvSpPr>
+        <p:spPr/>
+        <p:txBody>
+          <a:bodyPr/>
+          <a:lstStyle/>
+          <a:p>
+            <a:r>
+              <a:rPr lang="en-US" dirty="0" smtClean="0"/>
+              <a:t>Gaussian Filter</a:t>
+            </a:r>
+            <a:endParaRPr lang="en-US" dirty="0"/>
+          </a:p>
+        </p:txBody>
+      </p:sp>
+      <p:sp>
+        <p:nvSpPr>
+          <p:cNvPr id="3" name="Content Placeholder 2"/>
+          <p:cNvSpPr>
+            <a:spLocks noGrp="1"/>
+          </p:cNvSpPr>
+          <p:nvPr>
+            <p:ph sz="half" idx="1"/>
+          </p:nvPr>
+        </p:nvSpPr>
+        <p:spPr/>
+        <p:txBody>
+          <a:bodyPr/>
+          <a:lstStyle/>
+          <a:p>
+            <a:r>
+              <a:rPr lang="en-US" dirty="0" smtClean="0"/>
+              <a:t>TODO Add </a:t>
+            </a:r>
+            <a:r>
+              <a:rPr lang="en-US" dirty="0" err="1" smtClean="0"/>
+              <a:t>nonfilterd</a:t>
+            </a:r>
+            <a:endParaRPr lang="en-US" dirty="0"/>
+          </a:p>
+        </p:txBody>
+      </p:sp>
+      <p:sp>
+        <p:nvSpPr>
+          <p:cNvPr id="4" name="Content Placeholder 3"/>
+          <p:cNvSpPr>
+            <a:spLocks noGrp="1"/>
+          </p:cNvSpPr>
+          <p:nvPr>
+            <p:ph sz="half" idx="2"/>
+          </p:nvPr>
+        </p:nvSpPr>
+        <p:spPr/>
+        <p:txBody>
+          <a:bodyPr/>
+          <a:lstStyle/>
+          <a:p>
+            <a:r>
+              <a:rPr lang="en-US" dirty="0"/>
+              <a:t>TODO </a:t>
+            </a:r>
+            <a:r>
+              <a:rPr lang="en-US" smtClean="0"/>
+              <a:t>Add filter</a:t>
+            </a:r>
+            <a:endParaRPr lang="en-US" dirty="0"/>
+          </a:p>
+        </p:txBody>
+      </p:sp>
+      <p:sp>
+        <p:nvSpPr>
+          <p:cNvPr id="5" name="Footer Placeholder 4"/>
+          <p:cNvSpPr>
+            <a:spLocks noGrp="1"/>
+          </p:cNvSpPr>
+          <p:nvPr>
+            <p:ph type="ftr" sz="quarter" idx="10"/>
+          </p:nvPr>
+        </p:nvSpPr>
+        <p:spPr/>
+        <p:txBody>
+          <a:bodyPr/>
+          <a:lstStyle/>
+          <a:p>
+            <a:pPr>
+              <a:defRPr/>
+            </a:pPr>
+            <a:r>
+              <a:rPr lang="de-AT" dirty="0"/>
+              <a:t>Andreas </a:t>
+            </a:r>
+            <a:r>
+              <a:rPr lang="de-AT" dirty="0" err="1"/>
+              <a:t>Gogel</a:t>
+            </a:r>
+            <a:r>
+              <a:rPr lang="de-AT" dirty="0"/>
+              <a:t> </a:t>
+            </a:r>
+            <a:r>
+              <a:rPr lang="de-AT" dirty="0" err="1"/>
+              <a:t>and</a:t>
+            </a:r>
+            <a:r>
+              <a:rPr lang="de-AT" dirty="0"/>
+              <a:t> David Pfahler</a:t>
+            </a:r>
+            <a:endParaRPr lang="de-AT" dirty="0"/>
+          </a:p>
+        </p:txBody>
+      </p:sp>
+      <p:sp>
+        <p:nvSpPr>
+          <p:cNvPr id="6" name="Slide Number Placeholder 5"/>
+          <p:cNvSpPr>
+            <a:spLocks noGrp="1"/>
+          </p:cNvSpPr>
+          <p:nvPr>
+            <p:ph type="sldNum" sz="quarter" idx="11"/>
+          </p:nvPr>
+        </p:nvSpPr>
+        <p:spPr/>
+        <p:txBody>
+          <a:bodyPr/>
+          <a:lstStyle/>
+          <a:p>
+            <a:pPr>
+              <a:defRPr/>
+            </a:pPr>
+            <a:fld id="{63707275-EA33-4C2C-A96C-B80BEB93EE54}" type="slidenum">
+              <a:rPr lang="de-AT" smtClean="0"/>
+              <a:t>7</a:t>
+            </a:fld>
+            <a:endParaRPr lang="de-AT" dirty="0"/>
+          </a:p>
+        </p:txBody>
+      </p:sp>
+    </p:spTree>
+    <p:extLst>
+      <p:ext uri="{BB962C8B-B14F-4D97-AF65-F5344CB8AC3E}">
+        <p14:creationId xmlns:p14="http://schemas.microsoft.com/office/powerpoint/2010/main" val="3289126827"/>
+      </p:ext>
+    </p:extLst>
+  </p:cSld>
+  <p:clrMapOvr>
+    <a:masterClrMapping/>
+  </p:clrMapOvr>
+</p:sld>
+</file>
+
+<file path=ppt/slides/slide8.xml><?xml version="1.0" encoding="utf-8"?>
+<p:sld xmlns:a="http://schemas.openxmlformats.org/drawingml/2006/main" xmlns:r="http://schemas.openxmlformats.org/officeDocument/2006/relationships" xmlns:p="http://schemas.openxmlformats.org/presentationml/2006/main">
+  <p:cSld>
+    <p:spTree>
+      <p:nvGrpSpPr>
+        <p:cNvPr id="1" name=""/>
+        <p:cNvGrpSpPr/>
+        <p:nvPr/>
+      </p:nvGrpSpPr>
+      <p:grpSpPr>
+        <a:xfrm>
+          <a:off x="0" y="0"/>
+          <a:ext cx="0" cy="0"/>
+          <a:chOff x="0" y="0"/>
+          <a:chExt cx="0" cy="0"/>
+        </a:xfrm>
+      </p:grpSpPr>
+      <p:sp>
+        <p:nvSpPr>
+          <p:cNvPr id="2" name="Title 1"/>
+          <p:cNvSpPr>
+            <a:spLocks noGrp="1"/>
+          </p:cNvSpPr>
+          <p:nvPr>
+            <p:ph type="title"/>
+          </p:nvPr>
+        </p:nvSpPr>
+        <p:spPr/>
+        <p:txBody>
+          <a:bodyPr/>
+          <a:lstStyle/>
+          <a:p>
+            <a:r>
+              <a:rPr lang="en-US" dirty="0" smtClean="0"/>
+              <a:t>Bilateral Filter</a:t>
+            </a:r>
+            <a:endParaRPr lang="en-US" dirty="0"/>
+          </a:p>
+        </p:txBody>
+      </p:sp>
+      <p:sp>
+        <p:nvSpPr>
+          <p:cNvPr id="3" name="Content Placeholder 2"/>
+          <p:cNvSpPr>
+            <a:spLocks noGrp="1"/>
+          </p:cNvSpPr>
+          <p:nvPr>
+            <p:ph sz="half" idx="1"/>
+          </p:nvPr>
+        </p:nvSpPr>
+        <p:spPr/>
+        <p:txBody>
+          <a:bodyPr/>
+          <a:lstStyle/>
+          <a:p>
+            <a:r>
+              <a:rPr lang="en-US" dirty="0" smtClean="0"/>
+              <a:t>TODO add non filtered</a:t>
+            </a:r>
+            <a:endParaRPr lang="en-US" dirty="0"/>
+          </a:p>
+        </p:txBody>
+      </p:sp>
+      <p:sp>
+        <p:nvSpPr>
+          <p:cNvPr id="4" name="Content Placeholder 3"/>
+          <p:cNvSpPr>
+            <a:spLocks noGrp="1"/>
+          </p:cNvSpPr>
+          <p:nvPr>
+            <p:ph sz="half" idx="2"/>
+          </p:nvPr>
+        </p:nvSpPr>
+        <p:spPr/>
+        <p:txBody>
+          <a:bodyPr/>
+          <a:lstStyle/>
+          <a:p>
+            <a:r>
+              <a:rPr lang="en-US" dirty="0"/>
+              <a:t>TODO add </a:t>
+            </a:r>
+            <a:r>
+              <a:rPr lang="en-US" dirty="0" smtClean="0"/>
+              <a:t>filtered</a:t>
+            </a:r>
+            <a:endParaRPr lang="en-US" dirty="0"/>
+          </a:p>
+        </p:txBody>
+      </p:sp>
+      <p:sp>
+        <p:nvSpPr>
+          <p:cNvPr id="5" name="Footer Placeholder 4"/>
+          <p:cNvSpPr>
+            <a:spLocks noGrp="1"/>
+          </p:cNvSpPr>
+          <p:nvPr>
+            <p:ph type="ftr" sz="quarter" idx="10"/>
+          </p:nvPr>
+        </p:nvSpPr>
+        <p:spPr/>
+        <p:txBody>
+          <a:bodyPr/>
+          <a:lstStyle/>
+          <a:p>
+            <a:pPr>
+              <a:defRPr/>
+            </a:pPr>
+            <a:r>
+              <a:rPr lang="de-AT" dirty="0"/>
+              <a:t>Andreas </a:t>
+            </a:r>
+            <a:r>
+              <a:rPr lang="de-AT" dirty="0" err="1"/>
+              <a:t>Gogel</a:t>
+            </a:r>
+            <a:r>
+              <a:rPr lang="de-AT" dirty="0"/>
+              <a:t> </a:t>
+            </a:r>
+            <a:r>
+              <a:rPr lang="de-AT" dirty="0" err="1"/>
+              <a:t>and</a:t>
+            </a:r>
+            <a:r>
+              <a:rPr lang="de-AT" dirty="0"/>
+              <a:t> David Pfahler</a:t>
+            </a:r>
+            <a:endParaRPr lang="de-AT" dirty="0"/>
+          </a:p>
+        </p:txBody>
+      </p:sp>
+      <p:sp>
+        <p:nvSpPr>
+          <p:cNvPr id="6" name="Slide Number Placeholder 5"/>
+          <p:cNvSpPr>
+            <a:spLocks noGrp="1"/>
+          </p:cNvSpPr>
+          <p:nvPr>
+            <p:ph type="sldNum" sz="quarter" idx="11"/>
+          </p:nvPr>
+        </p:nvSpPr>
+        <p:spPr/>
+        <p:txBody>
+          <a:bodyPr/>
+          <a:lstStyle/>
+          <a:p>
+            <a:pPr>
+              <a:defRPr/>
+            </a:pPr>
+            <a:fld id="{63707275-EA33-4C2C-A96C-B80BEB93EE54}" type="slidenum">
+              <a:rPr lang="de-AT" smtClean="0"/>
+              <a:t>8</a:t>
+            </a:fld>
+            <a:endParaRPr lang="de-AT" dirty="0"/>
+          </a:p>
+        </p:txBody>
+      </p:sp>
+    </p:spTree>
+    <p:extLst>
+      <p:ext uri="{BB962C8B-B14F-4D97-AF65-F5344CB8AC3E}">
+        <p14:creationId xmlns:p14="http://schemas.microsoft.com/office/powerpoint/2010/main" val="4047059192"/>
+      </p:ext>
+    </p:extLst>
+  </p:cSld>
+  <p:clrMapOvr>
+    <a:masterClrMapping/>
+  </p:clrMapOvr>
+</p:sld>
+</file>
+
+<file path=ppt/slides/slide9.xml><?xml version="1.0" encoding="utf-8"?>
+<p:sld xmlns:a="http://schemas.openxmlformats.org/drawingml/2006/main" xmlns:r="http://schemas.openxmlformats.org/officeDocument/2006/relationships" xmlns:p="http://schemas.openxmlformats.org/presentationml/2006/main">
+  <p:cSld>
+    <p:spTree>
+      <p:nvGrpSpPr>
+        <p:cNvPr id="1" name=""/>
+        <p:cNvGrpSpPr/>
+        <p:nvPr/>
+      </p:nvGrpSpPr>
+      <p:grpSpPr>
+        <a:xfrm>
+          <a:off x="0" y="0"/>
+          <a:ext cx="0" cy="0"/>
+          <a:chOff x="0" y="0"/>
+          <a:chExt cx="0" cy="0"/>
+        </a:xfrm>
+      </p:grpSpPr>
+      <p:sp>
+        <p:nvSpPr>
+          <p:cNvPr id="2" name="Title 1"/>
+          <p:cNvSpPr>
+            <a:spLocks noGrp="1"/>
+          </p:cNvSpPr>
+          <p:nvPr>
+            <p:ph type="title"/>
+          </p:nvPr>
+        </p:nvSpPr>
+        <p:spPr/>
+        <p:txBody>
+          <a:bodyPr/>
+          <a:lstStyle/>
+          <a:p>
+            <a:r>
+              <a:rPr lang="en-US" dirty="0" smtClean="0"/>
+              <a:t>Median Filter</a:t>
+            </a:r>
+            <a:endParaRPr lang="en-US" dirty="0"/>
+          </a:p>
+        </p:txBody>
+      </p:sp>
+      <p:sp>
+        <p:nvSpPr>
+          <p:cNvPr id="3" name="Content Placeholder 2"/>
+          <p:cNvSpPr>
+            <a:spLocks noGrp="1"/>
+          </p:cNvSpPr>
+          <p:nvPr>
+            <p:ph sz="half" idx="1"/>
+          </p:nvPr>
+        </p:nvSpPr>
+        <p:spPr/>
+        <p:txBody>
+          <a:bodyPr/>
+          <a:lstStyle/>
+          <a:p>
+            <a:r>
+              <a:rPr lang="en-US" dirty="0"/>
+              <a:t>TODO add non filtered</a:t>
+            </a:r>
+          </a:p>
+          <a:p>
+            <a:endParaRPr lang="en-US" dirty="0"/>
+          </a:p>
+        </p:txBody>
+      </p:sp>
+      <p:sp>
+        <p:nvSpPr>
+          <p:cNvPr id="4" name="Content Placeholder 3"/>
+          <p:cNvSpPr>
+            <a:spLocks noGrp="1"/>
+          </p:cNvSpPr>
+          <p:nvPr>
+            <p:ph sz="half" idx="2"/>
+          </p:nvPr>
+        </p:nvSpPr>
+        <p:spPr/>
+        <p:txBody>
+          <a:bodyPr/>
+          <a:lstStyle/>
+          <a:p>
+            <a:r>
+              <a:rPr lang="en-US" dirty="0"/>
+              <a:t>TODO add </a:t>
+            </a:r>
+            <a:r>
+              <a:rPr lang="en-US" dirty="0" smtClean="0"/>
+              <a:t>filtered</a:t>
+            </a:r>
+            <a:endParaRPr lang="en-US" dirty="0"/>
+          </a:p>
+          <a:p>
+            <a:endParaRPr lang="en-US" dirty="0"/>
+          </a:p>
+        </p:txBody>
+      </p:sp>
+      <p:sp>
+        <p:nvSpPr>
+          <p:cNvPr id="5" name="Footer Placeholder 4"/>
+          <p:cNvSpPr>
+            <a:spLocks noGrp="1"/>
+          </p:cNvSpPr>
+          <p:nvPr>
+            <p:ph type="ftr" sz="quarter" idx="10"/>
+          </p:nvPr>
+        </p:nvSpPr>
+        <p:spPr/>
+        <p:txBody>
+          <a:bodyPr/>
+          <a:lstStyle/>
+          <a:p>
+            <a:pPr>
+              <a:defRPr/>
+            </a:pPr>
+            <a:r>
+              <a:rPr lang="de-AT" dirty="0"/>
+              <a:t>Andreas </a:t>
+            </a:r>
+            <a:r>
+              <a:rPr lang="de-AT" dirty="0" err="1"/>
+              <a:t>Gogel</a:t>
+            </a:r>
+            <a:r>
+              <a:rPr lang="de-AT" dirty="0"/>
+              <a:t> </a:t>
+            </a:r>
+            <a:r>
+              <a:rPr lang="de-AT" dirty="0" err="1"/>
+              <a:t>and</a:t>
+            </a:r>
+            <a:r>
+              <a:rPr lang="de-AT" dirty="0"/>
+              <a:t> David Pfahler</a:t>
+            </a:r>
+            <a:endParaRPr lang="de-AT" dirty="0"/>
+          </a:p>
+        </p:txBody>
+      </p:sp>
+      <p:sp>
+        <p:nvSpPr>
+          <p:cNvPr id="6" name="Slide Number Placeholder 5"/>
+          <p:cNvSpPr>
+            <a:spLocks noGrp="1"/>
+          </p:cNvSpPr>
+          <p:nvPr>
+            <p:ph type="sldNum" sz="quarter" idx="11"/>
+          </p:nvPr>
+        </p:nvSpPr>
+        <p:spPr/>
+        <p:txBody>
+          <a:bodyPr/>
+          <a:lstStyle/>
+          <a:p>
+            <a:pPr>
+              <a:defRPr/>
+            </a:pPr>
+            <a:fld id="{63707275-EA33-4C2C-A96C-B80BEB93EE54}" type="slidenum">
+              <a:rPr lang="de-AT" smtClean="0"/>
+              <a:t>9</a:t>
+            </a:fld>
+            <a:endParaRPr lang="de-AT" dirty="0"/>
+          </a:p>
+        </p:txBody>
+      </p:sp>
+    </p:spTree>
+    <p:extLst>
+      <p:ext uri="{BB962C8B-B14F-4D97-AF65-F5344CB8AC3E}">
+        <p14:creationId xmlns:p14="http://schemas.microsoft.com/office/powerpoint/2010/main" val="1181706103"/>
+      </p:ext>
+    </p:extLst>
+  </p:cSld>
+  <p:clrMapOvr>
+    <a:masterClrMapping/>
+  </p:clrMapOvr>
 </p:sld>
 </file>
 

</xml_diff>

<commit_message>
[DOC] finished the slides
</commit_message>
<xml_diff>
--- a/Slides/MedVis2.pptx
+++ b/Slides/MedVis2.pptx
@@ -5,10 +5,10 @@
     <p:sldMasterId id="2147483660" r:id="rId1"/>
   </p:sldMasterIdLst>
   <p:notesMasterIdLst>
-    <p:notesMasterId r:id="rId15"/>
+    <p:notesMasterId r:id="rId17"/>
   </p:notesMasterIdLst>
   <p:handoutMasterIdLst>
-    <p:handoutMasterId r:id="rId16"/>
+    <p:handoutMasterId r:id="rId18"/>
   </p:handoutMasterIdLst>
   <p:sldIdLst>
     <p:sldId id="259" r:id="rId2"/>
@@ -20,15 +20,17 @@
     <p:sldId id="263" r:id="rId8"/>
     <p:sldId id="264" r:id="rId9"/>
     <p:sldId id="265" r:id="rId10"/>
-    <p:sldId id="266" r:id="rId11"/>
-    <p:sldId id="268" r:id="rId12"/>
-    <p:sldId id="270" r:id="rId13"/>
-    <p:sldId id="271" r:id="rId14"/>
+    <p:sldId id="273" r:id="rId11"/>
+    <p:sldId id="266" r:id="rId12"/>
+    <p:sldId id="268" r:id="rId13"/>
+    <p:sldId id="270" r:id="rId14"/>
+    <p:sldId id="271" r:id="rId15"/>
+    <p:sldId id="272" r:id="rId16"/>
   </p:sldIdLst>
   <p:sldSz cx="9144000" cy="6858000" type="screen4x3"/>
   <p:notesSz cx="7099300" cy="10234613"/>
   <p:custDataLst>
-    <p:tags r:id="rId17"/>
+    <p:tags r:id="rId19"/>
   </p:custDataLst>
   <p:kinsoku lang="ja-JP" invalStChars="、。，．・：；？！゛゜ヽヾゝゞ々ー’”）〕］｝〉》」』】°‰′″℃￠％ぁぃぅぇぉっゃゅょゎァィゥェォッャュョヮヵヶ!%),.:;?]}｡｣､･ｧｨｩｪｫｬｭｮｯｰﾞﾟ" invalEndChars="‘“（〔［｛〈《「『【￥＄$([\{｢￡"/>
   <p:defaultTextStyle>
@@ -19520,79 +19522,81 @@
             <p:ph type="title"/>
           </p:nvPr>
         </p:nvSpPr>
-        <p:spPr>
-          <a:xfrm>
-            <a:off x="467544" y="0"/>
-            <a:ext cx="7761287" cy="757238"/>
-          </a:xfrm>
-        </p:spPr>
+        <p:spPr/>
         <p:txBody>
           <a:bodyPr/>
           <a:lstStyle/>
           <a:p>
             <a:r>
               <a:rPr lang="en-US" dirty="0" smtClean="0"/>
-              <a:t>Gradient Filter</a:t>
+              <a:t>Median </a:t>
+            </a:r>
+            <a:r>
+              <a:rPr lang="en-US" dirty="0" smtClean="0"/>
+              <a:t>Filter 3x3</a:t>
             </a:r>
             <a:endParaRPr lang="en-US" dirty="0"/>
           </a:p>
         </p:txBody>
       </p:sp>
-      <p:sp>
-        <p:nvSpPr>
-          <p:cNvPr id="3" name="Content Placeholder 2"/>
-          <p:cNvSpPr>
-            <a:spLocks noGrp="1"/>
-          </p:cNvSpPr>
+      <p:pic>
+        <p:nvPicPr>
+          <p:cNvPr id="7" name="Content Placeholder 6"/>
+          <p:cNvPicPr>
+            <a:picLocks noGrp="1" noChangeAspect="1"/>
+          </p:cNvPicPr>
           <p:nvPr>
             <p:ph sz="half" idx="1"/>
           </p:nvPr>
-        </p:nvSpPr>
-        <p:spPr/>
-        <p:txBody>
-          <a:bodyPr/>
-          <a:lstStyle/>
-          <a:p>
-            <a:r>
-              <a:rPr lang="en-US" dirty="0"/>
-              <a:t>TODO add non filtered</a:t>
-            </a:r>
-          </a:p>
-          <a:p>
-            <a:endParaRPr lang="en-US" dirty="0"/>
-          </a:p>
-        </p:txBody>
-      </p:sp>
-      <p:sp>
-        <p:nvSpPr>
-          <p:cNvPr id="4" name="Content Placeholder 3"/>
-          <p:cNvSpPr>
-            <a:spLocks noGrp="1"/>
-          </p:cNvSpPr>
+        </p:nvPicPr>
+        <p:blipFill>
+          <a:blip r:embed="rId2" cstate="print">
+            <a:extLst>
+              <a:ext uri="{28A0092B-C50C-407E-A947-70E740481C1C}">
+                <a14:useLocalDpi xmlns:a14="http://schemas.microsoft.com/office/drawing/2010/main" val="0"/>
+              </a:ext>
+            </a:extLst>
+          </a:blip>
+          <a:stretch>
+            <a:fillRect/>
+          </a:stretch>
+        </p:blipFill>
+        <p:spPr>
+          <a:xfrm>
+            <a:off x="179388" y="1215582"/>
+            <a:ext cx="4351337" cy="4858635"/>
+          </a:xfrm>
+        </p:spPr>
+      </p:pic>
+      <p:pic>
+        <p:nvPicPr>
+          <p:cNvPr id="8" name="Content Placeholder 7"/>
+          <p:cNvPicPr>
+            <a:picLocks noGrp="1" noChangeAspect="1"/>
+          </p:cNvPicPr>
           <p:nvPr>
             <p:ph sz="half" idx="2"/>
           </p:nvPr>
-        </p:nvSpPr>
-        <p:spPr/>
-        <p:txBody>
-          <a:bodyPr/>
-          <a:lstStyle/>
-          <a:p>
-            <a:r>
-              <a:rPr lang="en-US" dirty="0"/>
-              <a:t>TODO add </a:t>
-            </a:r>
-            <a:r>
-              <a:rPr lang="en-US" dirty="0" smtClean="0"/>
-              <a:t>filtered</a:t>
-            </a:r>
-            <a:endParaRPr lang="en-US" dirty="0"/>
-          </a:p>
-          <a:p>
-            <a:endParaRPr lang="en-US" dirty="0"/>
-          </a:p>
-        </p:txBody>
-      </p:sp>
+        </p:nvPicPr>
+        <p:blipFill>
+          <a:blip r:embed="rId3" cstate="print">
+            <a:extLst>
+              <a:ext uri="{28A0092B-C50C-407E-A947-70E740481C1C}">
+                <a14:useLocalDpi xmlns:a14="http://schemas.microsoft.com/office/drawing/2010/main" val="0"/>
+              </a:ext>
+            </a:extLst>
+          </a:blip>
+          <a:stretch>
+            <a:fillRect/>
+          </a:stretch>
+        </p:blipFill>
+        <p:spPr>
+          <a:xfrm>
+            <a:off x="4683125" y="1215581"/>
+            <a:ext cx="4352925" cy="4858635"/>
+          </a:xfrm>
+        </p:spPr>
+      </p:pic>
       <p:sp>
         <p:nvSpPr>
           <p:cNvPr id="5" name="Footer Placeholder 4"/>
@@ -19631,7 +19635,6 @@
               <a:rPr lang="de-AT" dirty="0"/>
               <a:t> David Pfahler</a:t>
             </a:r>
-            <a:endParaRPr lang="de-AT" dirty="0"/>
           </a:p>
         </p:txBody>
       </p:sp>
@@ -19664,6 +19667,189 @@
     </p:spTree>
     <p:extLst>
       <p:ext uri="{BB962C8B-B14F-4D97-AF65-F5344CB8AC3E}">
+        <p14:creationId xmlns:p14="http://schemas.microsoft.com/office/powerpoint/2010/main" val="3770985398"/>
+      </p:ext>
+    </p:extLst>
+  </p:cSld>
+  <p:clrMapOvr>
+    <a:masterClrMapping/>
+  </p:clrMapOvr>
+</p:sld>
+</file>
+
+<file path=ppt/slides/slide11.xml><?xml version="1.0" encoding="utf-8"?>
+<p:sld xmlns:a="http://schemas.openxmlformats.org/drawingml/2006/main" xmlns:r="http://schemas.openxmlformats.org/officeDocument/2006/relationships" xmlns:p="http://schemas.openxmlformats.org/presentationml/2006/main">
+  <p:cSld>
+    <p:spTree>
+      <p:nvGrpSpPr>
+        <p:cNvPr id="1" name=""/>
+        <p:cNvGrpSpPr/>
+        <p:nvPr/>
+      </p:nvGrpSpPr>
+      <p:grpSpPr>
+        <a:xfrm>
+          <a:off x="0" y="0"/>
+          <a:ext cx="0" cy="0"/>
+          <a:chOff x="0" y="0"/>
+          <a:chExt cx="0" cy="0"/>
+        </a:xfrm>
+      </p:grpSpPr>
+      <p:sp>
+        <p:nvSpPr>
+          <p:cNvPr id="2" name="Title 1"/>
+          <p:cNvSpPr>
+            <a:spLocks noGrp="1"/>
+          </p:cNvSpPr>
+          <p:nvPr>
+            <p:ph type="title"/>
+          </p:nvPr>
+        </p:nvSpPr>
+        <p:spPr>
+          <a:xfrm>
+            <a:off x="467544" y="0"/>
+            <a:ext cx="7761287" cy="757238"/>
+          </a:xfrm>
+        </p:spPr>
+        <p:txBody>
+          <a:bodyPr/>
+          <a:lstStyle/>
+          <a:p>
+            <a:r>
+              <a:rPr lang="en-US" dirty="0" smtClean="0"/>
+              <a:t>Gradient Filter</a:t>
+            </a:r>
+            <a:endParaRPr lang="en-US" dirty="0"/>
+          </a:p>
+        </p:txBody>
+      </p:sp>
+      <p:pic>
+        <p:nvPicPr>
+          <p:cNvPr id="7" name="Content Placeholder 6"/>
+          <p:cNvPicPr>
+            <a:picLocks noGrp="1" noChangeAspect="1"/>
+          </p:cNvPicPr>
+          <p:nvPr>
+            <p:ph sz="half" idx="1"/>
+          </p:nvPr>
+        </p:nvPicPr>
+        <p:blipFill>
+          <a:blip r:embed="rId2" cstate="print">
+            <a:extLst>
+              <a:ext uri="{28A0092B-C50C-407E-A947-70E740481C1C}">
+                <a14:useLocalDpi xmlns:a14="http://schemas.microsoft.com/office/drawing/2010/main" val="0"/>
+              </a:ext>
+            </a:extLst>
+          </a:blip>
+          <a:stretch>
+            <a:fillRect/>
+          </a:stretch>
+        </p:blipFill>
+        <p:spPr>
+          <a:xfrm>
+            <a:off x="179388" y="1215582"/>
+            <a:ext cx="4351337" cy="4858635"/>
+          </a:xfrm>
+        </p:spPr>
+      </p:pic>
+      <p:pic>
+        <p:nvPicPr>
+          <p:cNvPr id="8" name="Content Placeholder 7"/>
+          <p:cNvPicPr>
+            <a:picLocks noGrp="1" noChangeAspect="1"/>
+          </p:cNvPicPr>
+          <p:nvPr>
+            <p:ph sz="half" idx="2"/>
+          </p:nvPr>
+        </p:nvPicPr>
+        <p:blipFill>
+          <a:blip r:embed="rId3" cstate="print">
+            <a:extLst>
+              <a:ext uri="{28A0092B-C50C-407E-A947-70E740481C1C}">
+                <a14:useLocalDpi xmlns:a14="http://schemas.microsoft.com/office/drawing/2010/main" val="0"/>
+              </a:ext>
+            </a:extLst>
+          </a:blip>
+          <a:stretch>
+            <a:fillRect/>
+          </a:stretch>
+        </p:blipFill>
+        <p:spPr>
+          <a:xfrm>
+            <a:off x="4683125" y="1212067"/>
+            <a:ext cx="4352925" cy="4865666"/>
+          </a:xfrm>
+        </p:spPr>
+      </p:pic>
+      <p:sp>
+        <p:nvSpPr>
+          <p:cNvPr id="5" name="Footer Placeholder 4"/>
+          <p:cNvSpPr>
+            <a:spLocks noGrp="1"/>
+          </p:cNvSpPr>
+          <p:nvPr>
+            <p:ph type="ftr" sz="quarter" idx="10"/>
+          </p:nvPr>
+        </p:nvSpPr>
+        <p:spPr/>
+        <p:txBody>
+          <a:bodyPr/>
+          <a:lstStyle/>
+          <a:p>
+            <a:pPr>
+              <a:defRPr/>
+            </a:pPr>
+            <a:r>
+              <a:rPr lang="de-AT" dirty="0"/>
+              <a:t>Andreas </a:t>
+            </a:r>
+            <a:r>
+              <a:rPr lang="de-AT" dirty="0" err="1"/>
+              <a:t>Gogel</a:t>
+            </a:r>
+            <a:r>
+              <a:rPr lang="de-AT" dirty="0"/>
+              <a:t> </a:t>
+            </a:r>
+            <a:r>
+              <a:rPr lang="de-AT" dirty="0" err="1"/>
+              <a:t>and</a:t>
+            </a:r>
+            <a:r>
+              <a:rPr lang="de-AT" dirty="0"/>
+              <a:t> David Pfahler</a:t>
+            </a:r>
+          </a:p>
+        </p:txBody>
+      </p:sp>
+      <p:sp>
+        <p:nvSpPr>
+          <p:cNvPr id="6" name="Slide Number Placeholder 5"/>
+          <p:cNvSpPr>
+            <a:spLocks noGrp="1"/>
+          </p:cNvSpPr>
+          <p:nvPr>
+            <p:ph type="sldNum" sz="quarter" idx="11"/>
+          </p:nvPr>
+        </p:nvSpPr>
+        <p:spPr/>
+        <p:txBody>
+          <a:bodyPr/>
+          <a:lstStyle/>
+          <a:p>
+            <a:pPr>
+              <a:defRPr/>
+            </a:pPr>
+            <a:fld id="{63707275-EA33-4C2C-A96C-B80BEB93EE54}" type="slidenum">
+              <a:rPr lang="de-AT" smtClean="0"/>
+              <a:t>11</a:t>
+            </a:fld>
+            <a:endParaRPr lang="de-AT" dirty="0"/>
+          </a:p>
+        </p:txBody>
+      </p:sp>
+    </p:spTree>
+    <p:extLst>
+      <p:ext uri="{BB962C8B-B14F-4D97-AF65-F5344CB8AC3E}">
         <p14:creationId xmlns:p14="http://schemas.microsoft.com/office/powerpoint/2010/main" val="1087487567"/>
       </p:ext>
     </p:extLst>
@@ -19674,7 +19860,7 @@
 </p:sld>
 </file>
 
-<file path=ppt/slides/slide11.xml><?xml version="1.0" encoding="utf-8"?>
+<file path=ppt/slides/slide12.xml><?xml version="1.0" encoding="utf-8"?>
 <p:sld xmlns:a="http://schemas.openxmlformats.org/drawingml/2006/main" xmlns:r="http://schemas.openxmlformats.org/officeDocument/2006/relationships" xmlns:p="http://schemas.openxmlformats.org/presentationml/2006/main">
   <p:cSld>
     <p:spTree>
@@ -19786,7 +19972,6 @@
               <a:rPr lang="de-AT" dirty="0"/>
               <a:t> David Pfahler</a:t>
             </a:r>
-            <a:endParaRPr lang="de-AT" dirty="0"/>
           </a:p>
         </p:txBody>
       </p:sp>
@@ -19810,7 +19995,7 @@
             </a:pPr>
             <a:fld id="{63707275-EA33-4C2C-A96C-B80BEB93EE54}" type="slidenum">
               <a:rPr lang="de-AT" smtClean="0"/>
-              <a:t>11</a:t>
+              <a:t>12</a:t>
             </a:fld>
             <a:endParaRPr lang="de-AT" dirty="0"/>
           </a:p>
@@ -19849,216 +20034,6 @@
     <p:extLst>
       <p:ext uri="{BB962C8B-B14F-4D97-AF65-F5344CB8AC3E}">
         <p14:creationId xmlns:p14="http://schemas.microsoft.com/office/powerpoint/2010/main" val="3773070277"/>
-      </p:ext>
-    </p:extLst>
-  </p:cSld>
-  <p:clrMapOvr>
-    <a:masterClrMapping/>
-  </p:clrMapOvr>
-</p:sld>
-</file>
-
-<file path=ppt/slides/slide12.xml><?xml version="1.0" encoding="utf-8"?>
-<p:sld xmlns:a="http://schemas.openxmlformats.org/drawingml/2006/main" xmlns:r="http://schemas.openxmlformats.org/officeDocument/2006/relationships" xmlns:p="http://schemas.openxmlformats.org/presentationml/2006/main">
-  <p:cSld>
-    <p:spTree>
-      <p:nvGrpSpPr>
-        <p:cNvPr id="1" name=""/>
-        <p:cNvGrpSpPr/>
-        <p:nvPr/>
-      </p:nvGrpSpPr>
-      <p:grpSpPr>
-        <a:xfrm>
-          <a:off x="0" y="0"/>
-          <a:ext cx="0" cy="0"/>
-          <a:chOff x="0" y="0"/>
-          <a:chExt cx="0" cy="0"/>
-        </a:xfrm>
-      </p:grpSpPr>
-      <p:sp>
-        <p:nvSpPr>
-          <p:cNvPr id="2" name="Title 1"/>
-          <p:cNvSpPr>
-            <a:spLocks noGrp="1"/>
-          </p:cNvSpPr>
-          <p:nvPr>
-            <p:ph type="title"/>
-          </p:nvPr>
-        </p:nvSpPr>
-        <p:spPr>
-          <a:xfrm>
-            <a:off x="467544" y="0"/>
-            <a:ext cx="7761287" cy="757238"/>
-          </a:xfrm>
-        </p:spPr>
-        <p:txBody>
-          <a:bodyPr/>
-          <a:lstStyle/>
-          <a:p>
-            <a:r>
-              <a:rPr lang="en-US" dirty="0" smtClean="0"/>
-              <a:t>DVR</a:t>
-            </a:r>
-            <a:endParaRPr lang="en-US" dirty="0"/>
-          </a:p>
-        </p:txBody>
-      </p:sp>
-      <p:sp>
-        <p:nvSpPr>
-          <p:cNvPr id="5" name="Footer Placeholder 4"/>
-          <p:cNvSpPr>
-            <a:spLocks noGrp="1"/>
-          </p:cNvSpPr>
-          <p:nvPr>
-            <p:ph type="ftr" sz="quarter" idx="10"/>
-          </p:nvPr>
-        </p:nvSpPr>
-        <p:spPr/>
-        <p:txBody>
-          <a:bodyPr/>
-          <a:lstStyle/>
-          <a:p>
-            <a:pPr>
-              <a:defRPr/>
-            </a:pPr>
-            <a:r>
-              <a:rPr lang="de-AT" dirty="0"/>
-              <a:t>Andreas </a:t>
-            </a:r>
-            <a:r>
-              <a:rPr lang="de-AT" dirty="0" err="1"/>
-              <a:t>Gogel</a:t>
-            </a:r>
-            <a:r>
-              <a:rPr lang="de-AT" dirty="0"/>
-              <a:t> </a:t>
-            </a:r>
-            <a:r>
-              <a:rPr lang="de-AT" dirty="0" err="1"/>
-              <a:t>and</a:t>
-            </a:r>
-            <a:r>
-              <a:rPr lang="de-AT" dirty="0"/>
-              <a:t> David Pfahler</a:t>
-            </a:r>
-            <a:endParaRPr lang="de-AT" dirty="0"/>
-          </a:p>
-        </p:txBody>
-      </p:sp>
-      <p:sp>
-        <p:nvSpPr>
-          <p:cNvPr id="6" name="Slide Number Placeholder 5"/>
-          <p:cNvSpPr>
-            <a:spLocks noGrp="1"/>
-          </p:cNvSpPr>
-          <p:nvPr>
-            <p:ph type="sldNum" sz="quarter" idx="11"/>
-          </p:nvPr>
-        </p:nvSpPr>
-        <p:spPr/>
-        <p:txBody>
-          <a:bodyPr/>
-          <a:lstStyle/>
-          <a:p>
-            <a:pPr>
-              <a:defRPr/>
-            </a:pPr>
-            <a:fld id="{63707275-EA33-4C2C-A96C-B80BEB93EE54}" type="slidenum">
-              <a:rPr lang="de-AT" smtClean="0"/>
-              <a:t>12</a:t>
-            </a:fld>
-            <a:endParaRPr lang="de-AT" dirty="0"/>
-          </a:p>
-        </p:txBody>
-      </p:sp>
-      <p:sp>
-        <p:nvSpPr>
-          <p:cNvPr id="7" name="Content Placeholder 6"/>
-          <p:cNvSpPr>
-            <a:spLocks noGrp="1"/>
-          </p:cNvSpPr>
-          <p:nvPr>
-            <p:ph sz="half" idx="1"/>
-          </p:nvPr>
-        </p:nvSpPr>
-        <p:spPr/>
-        <p:txBody>
-          <a:bodyPr/>
-          <a:lstStyle/>
-          <a:p>
-            <a:r>
-              <a:rPr lang="en-US" dirty="0" smtClean="0"/>
-              <a:t>Great Visualization Tool </a:t>
-            </a:r>
-            <a:r>
-              <a:rPr lang="en-US" b="1" dirty="0" smtClean="0"/>
-              <a:t>BUT</a:t>
-            </a:r>
-            <a:r>
-              <a:rPr lang="en-US" dirty="0" smtClean="0"/>
-              <a:t>:</a:t>
-            </a:r>
-          </a:p>
-          <a:p>
-            <a:pPr lvl="1"/>
-            <a:r>
-              <a:rPr lang="en-US" dirty="0" smtClean="0"/>
-              <a:t>Hard to get it running on windows.</a:t>
-            </a:r>
-          </a:p>
-          <a:p>
-            <a:pPr lvl="1"/>
-            <a:r>
-              <a:rPr lang="en-US" dirty="0" smtClean="0"/>
-              <a:t>Hard to implement abstract classes</a:t>
-            </a:r>
-          </a:p>
-          <a:p>
-            <a:pPr lvl="1"/>
-            <a:r>
-              <a:rPr lang="en-US" dirty="0" smtClean="0"/>
-              <a:t>Hard to connect with QT</a:t>
-            </a:r>
-          </a:p>
-          <a:p>
-            <a:pPr lvl="1"/>
-            <a:endParaRPr lang="en-US" dirty="0"/>
-          </a:p>
-        </p:txBody>
-      </p:sp>
-      <p:pic>
-        <p:nvPicPr>
-          <p:cNvPr id="11" name="Content Placeholder 10"/>
-          <p:cNvPicPr>
-            <a:picLocks noGrp="1" noChangeAspect="1"/>
-          </p:cNvPicPr>
-          <p:nvPr>
-            <p:ph sz="half" idx="2"/>
-          </p:nvPr>
-        </p:nvPicPr>
-        <p:blipFill>
-          <a:blip r:embed="rId2" cstate="print">
-            <a:extLst>
-              <a:ext uri="{28A0092B-C50C-407E-A947-70E740481C1C}">
-                <a14:useLocalDpi xmlns:a14="http://schemas.microsoft.com/office/drawing/2010/main" val="0"/>
-              </a:ext>
-            </a:extLst>
-          </a:blip>
-          <a:stretch>
-            <a:fillRect/>
-          </a:stretch>
-        </p:blipFill>
-        <p:spPr>
-          <a:xfrm>
-            <a:off x="4683125" y="1860201"/>
-            <a:ext cx="4352925" cy="3569398"/>
-          </a:xfrm>
-        </p:spPr>
-      </p:pic>
-    </p:spTree>
-    <p:extLst>
-      <p:ext uri="{BB962C8B-B14F-4D97-AF65-F5344CB8AC3E}">
-        <p14:creationId xmlns:p14="http://schemas.microsoft.com/office/powerpoint/2010/main" val="2263994035"/>
       </p:ext>
     </p:extLst>
   </p:cSld>
@@ -20151,7 +20126,6 @@
               <a:rPr lang="de-AT" dirty="0"/>
               <a:t> David Pfahler</a:t>
             </a:r>
-            <a:endParaRPr lang="de-AT" dirty="0"/>
           </a:p>
         </p:txBody>
       </p:sp>
@@ -20198,6 +20172,220 @@
           <a:p>
             <a:r>
               <a:rPr lang="en-US" dirty="0" smtClean="0"/>
+              <a:t>Great Visualization Tool </a:t>
+            </a:r>
+            <a:r>
+              <a:rPr lang="en-US" b="1" dirty="0" smtClean="0"/>
+              <a:t>BUT</a:t>
+            </a:r>
+            <a:r>
+              <a:rPr lang="en-US" dirty="0" smtClean="0"/>
+              <a:t>:</a:t>
+            </a:r>
+          </a:p>
+          <a:p>
+            <a:pPr lvl="1"/>
+            <a:r>
+              <a:rPr lang="en-US" dirty="0" smtClean="0"/>
+              <a:t>Hard to get it running on </a:t>
+            </a:r>
+            <a:r>
+              <a:rPr lang="en-US" dirty="0" smtClean="0"/>
+              <a:t>windows</a:t>
+            </a:r>
+            <a:endParaRPr lang="en-US" dirty="0" smtClean="0"/>
+          </a:p>
+          <a:p>
+            <a:pPr lvl="1"/>
+            <a:r>
+              <a:rPr lang="en-US" dirty="0" smtClean="0"/>
+              <a:t>Hard to implement abstract classes</a:t>
+            </a:r>
+          </a:p>
+          <a:p>
+            <a:pPr lvl="1"/>
+            <a:r>
+              <a:rPr lang="en-US" dirty="0" smtClean="0"/>
+              <a:t>Hard to connect with QT</a:t>
+            </a:r>
+          </a:p>
+          <a:p>
+            <a:pPr lvl="1"/>
+            <a:endParaRPr lang="en-US" dirty="0"/>
+          </a:p>
+        </p:txBody>
+      </p:sp>
+      <p:pic>
+        <p:nvPicPr>
+          <p:cNvPr id="11" name="Content Placeholder 10"/>
+          <p:cNvPicPr>
+            <a:picLocks noGrp="1" noChangeAspect="1"/>
+          </p:cNvPicPr>
+          <p:nvPr>
+            <p:ph sz="half" idx="2"/>
+          </p:nvPr>
+        </p:nvPicPr>
+        <p:blipFill>
+          <a:blip r:embed="rId2" cstate="print">
+            <a:extLst>
+              <a:ext uri="{28A0092B-C50C-407E-A947-70E740481C1C}">
+                <a14:useLocalDpi xmlns:a14="http://schemas.microsoft.com/office/drawing/2010/main" val="0"/>
+              </a:ext>
+            </a:extLst>
+          </a:blip>
+          <a:stretch>
+            <a:fillRect/>
+          </a:stretch>
+        </p:blipFill>
+        <p:spPr>
+          <a:xfrm>
+            <a:off x="4683125" y="1860201"/>
+            <a:ext cx="4352925" cy="3569398"/>
+          </a:xfrm>
+        </p:spPr>
+      </p:pic>
+    </p:spTree>
+    <p:extLst>
+      <p:ext uri="{BB962C8B-B14F-4D97-AF65-F5344CB8AC3E}">
+        <p14:creationId xmlns:p14="http://schemas.microsoft.com/office/powerpoint/2010/main" val="2263994035"/>
+      </p:ext>
+    </p:extLst>
+  </p:cSld>
+  <p:clrMapOvr>
+    <a:masterClrMapping/>
+  </p:clrMapOvr>
+</p:sld>
+</file>
+
+<file path=ppt/slides/slide14.xml><?xml version="1.0" encoding="utf-8"?>
+<p:sld xmlns:a="http://schemas.openxmlformats.org/drawingml/2006/main" xmlns:r="http://schemas.openxmlformats.org/officeDocument/2006/relationships" xmlns:p="http://schemas.openxmlformats.org/presentationml/2006/main">
+  <p:cSld>
+    <p:spTree>
+      <p:nvGrpSpPr>
+        <p:cNvPr id="1" name=""/>
+        <p:cNvGrpSpPr/>
+        <p:nvPr/>
+      </p:nvGrpSpPr>
+      <p:grpSpPr>
+        <a:xfrm>
+          <a:off x="0" y="0"/>
+          <a:ext cx="0" cy="0"/>
+          <a:chOff x="0" y="0"/>
+          <a:chExt cx="0" cy="0"/>
+        </a:xfrm>
+      </p:grpSpPr>
+      <p:sp>
+        <p:nvSpPr>
+          <p:cNvPr id="2" name="Title 1"/>
+          <p:cNvSpPr>
+            <a:spLocks noGrp="1"/>
+          </p:cNvSpPr>
+          <p:nvPr>
+            <p:ph type="title"/>
+          </p:nvPr>
+        </p:nvSpPr>
+        <p:spPr>
+          <a:xfrm>
+            <a:off x="467544" y="0"/>
+            <a:ext cx="7761287" cy="757238"/>
+          </a:xfrm>
+        </p:spPr>
+        <p:txBody>
+          <a:bodyPr/>
+          <a:lstStyle/>
+          <a:p>
+            <a:r>
+              <a:rPr lang="en-US" dirty="0" smtClean="0"/>
+              <a:t>DVR</a:t>
+            </a:r>
+            <a:endParaRPr lang="en-US" dirty="0"/>
+          </a:p>
+        </p:txBody>
+      </p:sp>
+      <p:sp>
+        <p:nvSpPr>
+          <p:cNvPr id="5" name="Footer Placeholder 4"/>
+          <p:cNvSpPr>
+            <a:spLocks noGrp="1"/>
+          </p:cNvSpPr>
+          <p:nvPr>
+            <p:ph type="ftr" sz="quarter" idx="10"/>
+          </p:nvPr>
+        </p:nvSpPr>
+        <p:spPr/>
+        <p:txBody>
+          <a:bodyPr/>
+          <a:lstStyle/>
+          <a:p>
+            <a:pPr>
+              <a:defRPr/>
+            </a:pPr>
+            <a:r>
+              <a:rPr lang="de-AT" dirty="0"/>
+              <a:t>Andreas </a:t>
+            </a:r>
+            <a:r>
+              <a:rPr lang="de-AT" dirty="0" err="1"/>
+              <a:t>Gogel</a:t>
+            </a:r>
+            <a:r>
+              <a:rPr lang="de-AT" dirty="0"/>
+              <a:t> </a:t>
+            </a:r>
+            <a:r>
+              <a:rPr lang="de-AT" dirty="0" err="1"/>
+              <a:t>and</a:t>
+            </a:r>
+            <a:r>
+              <a:rPr lang="de-AT" dirty="0"/>
+              <a:t> David Pfahler</a:t>
+            </a:r>
+          </a:p>
+        </p:txBody>
+      </p:sp>
+      <p:sp>
+        <p:nvSpPr>
+          <p:cNvPr id="6" name="Slide Number Placeholder 5"/>
+          <p:cNvSpPr>
+            <a:spLocks noGrp="1"/>
+          </p:cNvSpPr>
+          <p:nvPr>
+            <p:ph type="sldNum" sz="quarter" idx="11"/>
+          </p:nvPr>
+        </p:nvSpPr>
+        <p:spPr/>
+        <p:txBody>
+          <a:bodyPr/>
+          <a:lstStyle/>
+          <a:p>
+            <a:pPr>
+              <a:defRPr/>
+            </a:pPr>
+            <a:fld id="{63707275-EA33-4C2C-A96C-B80BEB93EE54}" type="slidenum">
+              <a:rPr lang="de-AT" smtClean="0"/>
+              <a:t>14</a:t>
+            </a:fld>
+            <a:endParaRPr lang="de-AT" dirty="0"/>
+          </a:p>
+        </p:txBody>
+      </p:sp>
+      <p:sp>
+        <p:nvSpPr>
+          <p:cNvPr id="7" name="Content Placeholder 6"/>
+          <p:cNvSpPr>
+            <a:spLocks noGrp="1"/>
+          </p:cNvSpPr>
+          <p:nvPr>
+            <p:ph sz="half" idx="1"/>
+          </p:nvPr>
+        </p:nvSpPr>
+        <p:spPr/>
+        <p:txBody>
+          <a:bodyPr/>
+          <a:lstStyle/>
+          <a:p>
+            <a:r>
+              <a:rPr lang="en-US" dirty="0" smtClean="0"/>
               <a:t>Lessons Learned:</a:t>
             </a:r>
           </a:p>
@@ -20212,8 +20400,17 @@
             <a:pPr lvl="1"/>
             <a:r>
               <a:rPr lang="en-US" dirty="0" smtClean="0"/>
-              <a:t>very easy to fulfill easy task</a:t>
+              <a:t>Very </a:t>
             </a:r>
+            <a:r>
+              <a:rPr lang="en-US" dirty="0" smtClean="0"/>
+              <a:t>easy to fulfill easy </a:t>
+            </a:r>
+            <a:r>
+              <a:rPr lang="en-US" dirty="0" smtClean="0"/>
+              <a:t>tasks</a:t>
+            </a:r>
+            <a:endParaRPr lang="en-US" dirty="0" smtClean="0"/>
           </a:p>
           <a:p>
             <a:pPr lvl="1"/>
@@ -20272,6 +20469,193 @@
     <p:extLst>
       <p:ext uri="{BB962C8B-B14F-4D97-AF65-F5344CB8AC3E}">
         <p14:creationId xmlns:p14="http://schemas.microsoft.com/office/powerpoint/2010/main" val="2611260474"/>
+      </p:ext>
+    </p:extLst>
+  </p:cSld>
+  <p:clrMapOvr>
+    <a:masterClrMapping/>
+  </p:clrMapOvr>
+</p:sld>
+</file>
+
+<file path=ppt/slides/slide15.xml><?xml version="1.0" encoding="utf-8"?>
+<p:sld xmlns:a="http://schemas.openxmlformats.org/drawingml/2006/main" xmlns:r="http://schemas.openxmlformats.org/officeDocument/2006/relationships" xmlns:p="http://schemas.openxmlformats.org/presentationml/2006/main">
+  <p:cSld>
+    <p:spTree>
+      <p:nvGrpSpPr>
+        <p:cNvPr id="1" name=""/>
+        <p:cNvGrpSpPr/>
+        <p:nvPr/>
+      </p:nvGrpSpPr>
+      <p:grpSpPr>
+        <a:xfrm>
+          <a:off x="0" y="0"/>
+          <a:ext cx="0" cy="0"/>
+          <a:chOff x="0" y="0"/>
+          <a:chExt cx="0" cy="0"/>
+        </a:xfrm>
+      </p:grpSpPr>
+      <p:sp>
+        <p:nvSpPr>
+          <p:cNvPr id="2" name="Title 1"/>
+          <p:cNvSpPr>
+            <a:spLocks noGrp="1"/>
+          </p:cNvSpPr>
+          <p:nvPr>
+            <p:ph type="title"/>
+          </p:nvPr>
+        </p:nvSpPr>
+        <p:spPr/>
+        <p:txBody>
+          <a:bodyPr/>
+          <a:lstStyle/>
+          <a:p>
+            <a:r>
+              <a:rPr lang="en-US" dirty="0" smtClean="0"/>
+              <a:t>Demo</a:t>
+            </a:r>
+            <a:endParaRPr lang="de-AT" dirty="0"/>
+          </a:p>
+        </p:txBody>
+      </p:sp>
+      <p:sp>
+        <p:nvSpPr>
+          <p:cNvPr id="3" name="Content Placeholder 2"/>
+          <p:cNvSpPr>
+            <a:spLocks noGrp="1"/>
+          </p:cNvSpPr>
+          <p:nvPr>
+            <p:ph sz="half" idx="1"/>
+          </p:nvPr>
+        </p:nvSpPr>
+        <p:spPr/>
+        <p:txBody>
+          <a:bodyPr/>
+          <a:lstStyle/>
+          <a:p>
+            <a:r>
+              <a:rPr lang="en-US" dirty="0" smtClean="0"/>
+              <a:t>Real Time</a:t>
+            </a:r>
+          </a:p>
+          <a:p>
+            <a:r>
+              <a:rPr lang="en-US" dirty="0" smtClean="0"/>
+              <a:t>Interactions</a:t>
+            </a:r>
+          </a:p>
+          <a:p>
+            <a:r>
+              <a:rPr lang="en-US" dirty="0" smtClean="0"/>
+              <a:t>Demo</a:t>
+            </a:r>
+          </a:p>
+          <a:p>
+            <a:endParaRPr lang="de-AT" dirty="0"/>
+          </a:p>
+        </p:txBody>
+      </p:sp>
+      <p:sp>
+        <p:nvSpPr>
+          <p:cNvPr id="5" name="Footer Placeholder 4"/>
+          <p:cNvSpPr>
+            <a:spLocks noGrp="1"/>
+          </p:cNvSpPr>
+          <p:nvPr>
+            <p:ph type="ftr" sz="quarter" idx="10"/>
+          </p:nvPr>
+        </p:nvSpPr>
+        <p:spPr/>
+        <p:txBody>
+          <a:bodyPr/>
+          <a:lstStyle/>
+          <a:p>
+            <a:pPr>
+              <a:defRPr/>
+            </a:pPr>
+            <a:r>
+              <a:rPr lang="de-AT" dirty="0"/>
+              <a:t>Andreas </a:t>
+            </a:r>
+            <a:r>
+              <a:rPr lang="de-AT" dirty="0" err="1"/>
+              <a:t>Gogel</a:t>
+            </a:r>
+            <a:r>
+              <a:rPr lang="de-AT" dirty="0"/>
+              <a:t> </a:t>
+            </a:r>
+            <a:r>
+              <a:rPr lang="de-AT" dirty="0" err="1"/>
+              <a:t>and</a:t>
+            </a:r>
+            <a:r>
+              <a:rPr lang="de-AT" dirty="0"/>
+              <a:t> David Pfahler</a:t>
+            </a:r>
+            <a:endParaRPr lang="de-AT" dirty="0"/>
+          </a:p>
+        </p:txBody>
+      </p:sp>
+      <p:sp>
+        <p:nvSpPr>
+          <p:cNvPr id="6" name="Slide Number Placeholder 5"/>
+          <p:cNvSpPr>
+            <a:spLocks noGrp="1"/>
+          </p:cNvSpPr>
+          <p:nvPr>
+            <p:ph type="sldNum" sz="quarter" idx="11"/>
+          </p:nvPr>
+        </p:nvSpPr>
+        <p:spPr/>
+        <p:txBody>
+          <a:bodyPr/>
+          <a:lstStyle/>
+          <a:p>
+            <a:pPr>
+              <a:defRPr/>
+            </a:pPr>
+            <a:fld id="{63707275-EA33-4C2C-A96C-B80BEB93EE54}" type="slidenum">
+              <a:rPr lang="de-AT" smtClean="0"/>
+              <a:t>15</a:t>
+            </a:fld>
+            <a:endParaRPr lang="de-AT" dirty="0"/>
+          </a:p>
+        </p:txBody>
+      </p:sp>
+      <p:pic>
+        <p:nvPicPr>
+          <p:cNvPr id="9" name="Content Placeholder 8"/>
+          <p:cNvPicPr>
+            <a:picLocks noGrp="1" noChangeAspect="1"/>
+          </p:cNvPicPr>
+          <p:nvPr>
+            <p:ph sz="half" idx="2"/>
+          </p:nvPr>
+        </p:nvPicPr>
+        <p:blipFill>
+          <a:blip r:embed="rId2">
+            <a:extLst>
+              <a:ext uri="{28A0092B-C50C-407E-A947-70E740481C1C}">
+                <a14:useLocalDpi xmlns:a14="http://schemas.microsoft.com/office/drawing/2010/main" val="0"/>
+              </a:ext>
+            </a:extLst>
+          </a:blip>
+          <a:stretch>
+            <a:fillRect/>
+          </a:stretch>
+        </p:blipFill>
+        <p:spPr>
+          <a:xfrm>
+            <a:off x="4767786" y="908050"/>
+            <a:ext cx="4183602" cy="5473700"/>
+          </a:xfrm>
+        </p:spPr>
+      </p:pic>
+    </p:spTree>
+    <p:extLst>
+      <p:ext uri="{BB962C8B-B14F-4D97-AF65-F5344CB8AC3E}">
+        <p14:creationId xmlns:p14="http://schemas.microsoft.com/office/powerpoint/2010/main" val="3782219808"/>
       </p:ext>
     </p:extLst>
   </p:cSld>
@@ -20907,11 +21291,7 @@
           <a:p>
             <a:r>
               <a:rPr lang="en-US" dirty="0" smtClean="0"/>
-              <a:t>Transfer </a:t>
-            </a:r>
-            <a:r>
-              <a:rPr lang="en-US" dirty="0" smtClean="0"/>
-              <a:t>Function Widget</a:t>
+              <a:t>Transfer Function Widget</a:t>
             </a:r>
             <a:endParaRPr lang="de-AT" dirty="0"/>
           </a:p>
@@ -20969,29 +21349,35 @@
           </a:p>
         </p:txBody>
       </p:sp>
-      <p:sp>
-        <p:nvSpPr>
-          <p:cNvPr id="8" name="Content Placeholder 7"/>
-          <p:cNvSpPr>
-            <a:spLocks noGrp="1"/>
-          </p:cNvSpPr>
+      <p:pic>
+        <p:nvPicPr>
+          <p:cNvPr id="3" name="Content Placeholder 2"/>
+          <p:cNvPicPr>
+            <a:picLocks noGrp="1" noChangeAspect="1"/>
+          </p:cNvPicPr>
           <p:nvPr>
             <p:ph sz="half" idx="1"/>
           </p:nvPr>
-        </p:nvSpPr>
-        <p:spPr/>
-        <p:txBody>
-          <a:bodyPr/>
-          <a:lstStyle/>
-          <a:p>
-            <a:r>
-              <a:rPr lang="en-US" dirty="0" smtClean="0"/>
-              <a:t>TODO Add TF Widget image</a:t>
-            </a:r>
-            <a:endParaRPr lang="en-US" dirty="0"/>
-          </a:p>
-        </p:txBody>
-      </p:sp>
+        </p:nvPicPr>
+        <p:blipFill>
+          <a:blip r:embed="rId2">
+            <a:extLst>
+              <a:ext uri="{28A0092B-C50C-407E-A947-70E740481C1C}">
+                <a14:useLocalDpi xmlns:a14="http://schemas.microsoft.com/office/drawing/2010/main" val="0"/>
+              </a:ext>
+            </a:extLst>
+          </a:blip>
+          <a:stretch>
+            <a:fillRect/>
+          </a:stretch>
+        </p:blipFill>
+        <p:spPr>
+          <a:xfrm>
+            <a:off x="1288256" y="2125662"/>
+            <a:ext cx="2133600" cy="3038475"/>
+          </a:xfrm>
+        </p:spPr>
+      </p:pic>
       <p:pic>
         <p:nvPicPr>
           <p:cNvPr id="11" name="Content Placeholder 10"/>
@@ -21003,7 +21389,7 @@
           </p:nvPr>
         </p:nvPicPr>
         <p:blipFill>
-          <a:blip r:embed="rId2">
+          <a:blip r:embed="rId3">
             <a:extLst>
               <a:ext uri="{28A0092B-C50C-407E-A947-70E740481C1C}">
                 <a14:useLocalDpi xmlns:a14="http://schemas.microsoft.com/office/drawing/2010/main" val="0"/>
@@ -21081,48 +21467,64 @@
           </a:p>
         </p:txBody>
       </p:sp>
-      <p:sp>
-        <p:nvSpPr>
-          <p:cNvPr id="3" name="Content Placeholder 2"/>
-          <p:cNvSpPr>
-            <a:spLocks noGrp="1"/>
-          </p:cNvSpPr>
+      <p:pic>
+        <p:nvPicPr>
+          <p:cNvPr id="10" name="Content Placeholder 9"/>
+          <p:cNvPicPr>
+            <a:picLocks noGrp="1" noChangeAspect="1"/>
+          </p:cNvPicPr>
           <p:nvPr>
             <p:ph sz="half" idx="1"/>
           </p:nvPr>
-        </p:nvSpPr>
-        <p:spPr/>
-        <p:txBody>
-          <a:bodyPr/>
-          <a:lstStyle/>
-          <a:p>
-            <a:r>
-              <a:rPr lang="en-US" dirty="0" smtClean="0"/>
-              <a:t>TODO add 4 filter images as teaser</a:t>
-            </a:r>
-            <a:endParaRPr lang="en-US" dirty="0"/>
-          </a:p>
-        </p:txBody>
-      </p:sp>
-      <p:sp>
-        <p:nvSpPr>
-          <p:cNvPr id="4" name="Content Placeholder 3"/>
-          <p:cNvSpPr>
-            <a:spLocks noGrp="1"/>
-          </p:cNvSpPr>
+        </p:nvPicPr>
+        <p:blipFill>
+          <a:blip r:embed="rId2" cstate="print">
+            <a:extLst>
+              <a:ext uri="{28A0092B-C50C-407E-A947-70E740481C1C}">
+                <a14:useLocalDpi xmlns:a14="http://schemas.microsoft.com/office/drawing/2010/main" val="0"/>
+              </a:ext>
+            </a:extLst>
+          </a:blip>
+          <a:stretch>
+            <a:fillRect/>
+          </a:stretch>
+        </p:blipFill>
+        <p:spPr>
+          <a:xfrm>
+            <a:off x="1226190" y="908050"/>
+            <a:ext cx="2257733" cy="2520950"/>
+          </a:xfrm>
+        </p:spPr>
+      </p:pic>
+      <p:pic>
+        <p:nvPicPr>
+          <p:cNvPr id="11" name="Content Placeholder 10"/>
+          <p:cNvPicPr>
+            <a:picLocks noGrp="1" noChangeAspect="1"/>
+          </p:cNvPicPr>
           <p:nvPr>
             <p:ph sz="half" idx="2"/>
           </p:nvPr>
-        </p:nvSpPr>
-        <p:spPr/>
-        <p:txBody>
-          <a:bodyPr/>
-          <a:lstStyle/>
-          <a:p>
-            <a:endParaRPr lang="en-US"/>
-          </a:p>
-        </p:txBody>
-      </p:sp>
+        </p:nvPicPr>
+        <p:blipFill>
+          <a:blip r:embed="rId3" cstate="print">
+            <a:extLst>
+              <a:ext uri="{28A0092B-C50C-407E-A947-70E740481C1C}">
+                <a14:useLocalDpi xmlns:a14="http://schemas.microsoft.com/office/drawing/2010/main" val="0"/>
+              </a:ext>
+            </a:extLst>
+          </a:blip>
+          <a:stretch>
+            <a:fillRect/>
+          </a:stretch>
+        </p:blipFill>
+        <p:spPr>
+          <a:xfrm>
+            <a:off x="5730915" y="908050"/>
+            <a:ext cx="2257345" cy="2520950"/>
+          </a:xfrm>
+        </p:spPr>
+      </p:pic>
       <p:sp>
         <p:nvSpPr>
           <p:cNvPr id="5" name="Footer Placeholder 4"/>
@@ -21161,7 +21563,6 @@
               <a:rPr lang="de-AT" dirty="0"/>
               <a:t> David Pfahler</a:t>
             </a:r>
-            <a:endParaRPr lang="de-AT" dirty="0"/>
           </a:p>
         </p:txBody>
       </p:sp>
@@ -21191,6 +21592,560 @@
           </a:p>
         </p:txBody>
       </p:sp>
+      <p:sp>
+        <p:nvSpPr>
+          <p:cNvPr id="8" name="Content Placeholder 2"/>
+          <p:cNvSpPr txBox="1">
+            <a:spLocks/>
+          </p:cNvSpPr>
+          <p:nvPr/>
+        </p:nvSpPr>
+        <p:spPr bwMode="auto">
+          <a:xfrm>
+            <a:off x="179388" y="3535362"/>
+            <a:ext cx="4351783" cy="2520950"/>
+          </a:xfrm>
+          <a:prstGeom prst="rect">
+            <a:avLst/>
+          </a:prstGeom>
+          <a:noFill/>
+          <a:ln w="9525">
+            <a:noFill/>
+            <a:miter lim="800000"/>
+            <a:headEnd/>
+            <a:tailEnd/>
+          </a:ln>
+        </p:spPr>
+        <p:txBody>
+          <a:bodyPr vert="horz" wrap="square" lIns="91440" tIns="45720" rIns="91440" bIns="45720" numCol="1" anchor="t" anchorCtr="0" compatLnSpc="1">
+            <a:prstTxWarp prst="textNoShape">
+              <a:avLst/>
+            </a:prstTxWarp>
+          </a:bodyPr>
+          <a:lstStyle>
+            <a:lvl1pPr marL="360363" indent="-360363" algn="l" rtl="0" eaLnBrk="0" fontAlgn="base" hangingPunct="0">
+              <a:spcBef>
+                <a:spcPct val="20000"/>
+              </a:spcBef>
+              <a:spcAft>
+                <a:spcPct val="0"/>
+              </a:spcAft>
+              <a:buClr>
+                <a:srgbClr val="2AA3D8"/>
+              </a:buClr>
+              <a:buSzPct val="65000"/>
+              <a:buFont typeface="Arial" charset="0"/>
+              <a:buBlip>
+                <a:blip r:embed="rId4"/>
+              </a:buBlip>
+              <a:defRPr sz="2800">
+                <a:solidFill>
+                  <a:schemeClr val="tx1"/>
+                </a:solidFill>
+                <a:latin typeface="+mn-lt"/>
+                <a:ea typeface="+mn-ea"/>
+                <a:cs typeface="+mn-cs"/>
+              </a:defRPr>
+            </a:lvl1pPr>
+            <a:lvl2pPr marL="900113" indent="-360363" algn="l" rtl="0" eaLnBrk="0" fontAlgn="base" hangingPunct="0">
+              <a:spcBef>
+                <a:spcPct val="20000"/>
+              </a:spcBef>
+              <a:spcAft>
+                <a:spcPct val="0"/>
+              </a:spcAft>
+              <a:buClr>
+                <a:srgbClr val="2AA3D8"/>
+              </a:buClr>
+              <a:buSzPct val="65000"/>
+              <a:buFont typeface="Arial" charset="0"/>
+              <a:buBlip>
+                <a:blip r:embed="rId4"/>
+              </a:buBlip>
+              <a:defRPr sz="2400">
+                <a:solidFill>
+                  <a:schemeClr val="tx1"/>
+                </a:solidFill>
+                <a:latin typeface="+mn-lt"/>
+              </a:defRPr>
+            </a:lvl2pPr>
+            <a:lvl3pPr marL="1346200" indent="-266700" algn="l" rtl="0" eaLnBrk="0" fontAlgn="base" hangingPunct="0">
+              <a:spcBef>
+                <a:spcPct val="20000"/>
+              </a:spcBef>
+              <a:spcAft>
+                <a:spcPct val="0"/>
+              </a:spcAft>
+              <a:buClr>
+                <a:srgbClr val="2AA3D8"/>
+              </a:buClr>
+              <a:buSzPct val="65000"/>
+              <a:buFont typeface="Arial" charset="0"/>
+              <a:buBlip>
+                <a:blip r:embed="rId4"/>
+              </a:buBlip>
+              <a:defRPr sz="2000">
+                <a:solidFill>
+                  <a:schemeClr val="tx1"/>
+                </a:solidFill>
+                <a:latin typeface="+mn-lt"/>
+              </a:defRPr>
+            </a:lvl3pPr>
+            <a:lvl4pPr marL="1792288" indent="-266700" algn="l" rtl="0" eaLnBrk="0" fontAlgn="base" hangingPunct="0">
+              <a:spcBef>
+                <a:spcPct val="20000"/>
+              </a:spcBef>
+              <a:spcAft>
+                <a:spcPct val="0"/>
+              </a:spcAft>
+              <a:buClr>
+                <a:srgbClr val="2AA3D8"/>
+              </a:buClr>
+              <a:buSzPct val="65000"/>
+              <a:buFont typeface="Arial" charset="0"/>
+              <a:buBlip>
+                <a:blip r:embed="rId4"/>
+              </a:buBlip>
+              <a:defRPr sz="1800">
+                <a:solidFill>
+                  <a:schemeClr val="tx1"/>
+                </a:solidFill>
+                <a:latin typeface="+mn-lt"/>
+              </a:defRPr>
+            </a:lvl4pPr>
+            <a:lvl5pPr marL="2239963" indent="-268288" algn="l" rtl="0" eaLnBrk="0" fontAlgn="base" hangingPunct="0">
+              <a:spcBef>
+                <a:spcPct val="20000"/>
+              </a:spcBef>
+              <a:spcAft>
+                <a:spcPct val="0"/>
+              </a:spcAft>
+              <a:buClr>
+                <a:srgbClr val="2AA3D8"/>
+              </a:buClr>
+              <a:buSzPct val="65000"/>
+              <a:buFont typeface="Arial" charset="0"/>
+              <a:buBlip>
+                <a:blip r:embed="rId4"/>
+              </a:buBlip>
+              <a:defRPr sz="1800">
+                <a:solidFill>
+                  <a:schemeClr val="tx1"/>
+                </a:solidFill>
+                <a:latin typeface="+mn-lt"/>
+              </a:defRPr>
+            </a:lvl5pPr>
+            <a:lvl6pPr marL="2697163" indent="-268288" algn="l" rtl="0" fontAlgn="base">
+              <a:spcBef>
+                <a:spcPct val="20000"/>
+              </a:spcBef>
+              <a:spcAft>
+                <a:spcPct val="0"/>
+              </a:spcAft>
+              <a:buClr>
+                <a:srgbClr val="2AA3D8"/>
+              </a:buClr>
+              <a:buSzPct val="65000"/>
+              <a:buFont typeface="Arial" charset="0"/>
+              <a:buBlip>
+                <a:blip r:embed="rId4"/>
+              </a:buBlip>
+              <a:defRPr sz="1800">
+                <a:solidFill>
+                  <a:schemeClr val="tx1"/>
+                </a:solidFill>
+                <a:latin typeface="+mn-lt"/>
+              </a:defRPr>
+            </a:lvl6pPr>
+            <a:lvl7pPr marL="3154363" indent="-268288" algn="l" rtl="0" fontAlgn="base">
+              <a:spcBef>
+                <a:spcPct val="20000"/>
+              </a:spcBef>
+              <a:spcAft>
+                <a:spcPct val="0"/>
+              </a:spcAft>
+              <a:buClr>
+                <a:srgbClr val="2AA3D8"/>
+              </a:buClr>
+              <a:buSzPct val="65000"/>
+              <a:buFont typeface="Arial" charset="0"/>
+              <a:buBlip>
+                <a:blip r:embed="rId4"/>
+              </a:buBlip>
+              <a:defRPr sz="1800">
+                <a:solidFill>
+                  <a:schemeClr val="tx1"/>
+                </a:solidFill>
+                <a:latin typeface="+mn-lt"/>
+              </a:defRPr>
+            </a:lvl7pPr>
+            <a:lvl8pPr marL="3611563" indent="-268288" algn="l" rtl="0" fontAlgn="base">
+              <a:spcBef>
+                <a:spcPct val="20000"/>
+              </a:spcBef>
+              <a:spcAft>
+                <a:spcPct val="0"/>
+              </a:spcAft>
+              <a:buClr>
+                <a:srgbClr val="2AA3D8"/>
+              </a:buClr>
+              <a:buSzPct val="65000"/>
+              <a:buFont typeface="Arial" charset="0"/>
+              <a:buBlip>
+                <a:blip r:embed="rId4"/>
+              </a:buBlip>
+              <a:defRPr sz="1800">
+                <a:solidFill>
+                  <a:schemeClr val="tx1"/>
+                </a:solidFill>
+                <a:latin typeface="+mn-lt"/>
+              </a:defRPr>
+            </a:lvl8pPr>
+            <a:lvl9pPr marL="4068763" indent="-268288" algn="l" rtl="0" fontAlgn="base">
+              <a:spcBef>
+                <a:spcPct val="20000"/>
+              </a:spcBef>
+              <a:spcAft>
+                <a:spcPct val="0"/>
+              </a:spcAft>
+              <a:buClr>
+                <a:srgbClr val="2AA3D8"/>
+              </a:buClr>
+              <a:buSzPct val="65000"/>
+              <a:buFont typeface="Arial" charset="0"/>
+              <a:buBlip>
+                <a:blip r:embed="rId4"/>
+              </a:buBlip>
+              <a:defRPr sz="1800">
+                <a:solidFill>
+                  <a:schemeClr val="tx1"/>
+                </a:solidFill>
+                <a:latin typeface="+mn-lt"/>
+              </a:defRPr>
+            </a:lvl9pPr>
+          </a:lstStyle>
+          <a:p>
+            <a:pPr marL="0" indent="0">
+              <a:buNone/>
+            </a:pPr>
+            <a:endParaRPr lang="en-US" kern="0" dirty="0"/>
+          </a:p>
+        </p:txBody>
+      </p:sp>
+      <p:sp>
+        <p:nvSpPr>
+          <p:cNvPr id="9" name="Content Placeholder 2"/>
+          <p:cNvSpPr txBox="1">
+            <a:spLocks/>
+          </p:cNvSpPr>
+          <p:nvPr/>
+        </p:nvSpPr>
+        <p:spPr bwMode="auto">
+          <a:xfrm>
+            <a:off x="4683125" y="3535362"/>
+            <a:ext cx="4351783" cy="2520950"/>
+          </a:xfrm>
+          <a:prstGeom prst="rect">
+            <a:avLst/>
+          </a:prstGeom>
+          <a:noFill/>
+          <a:ln w="9525">
+            <a:noFill/>
+            <a:miter lim="800000"/>
+            <a:headEnd/>
+            <a:tailEnd/>
+          </a:ln>
+        </p:spPr>
+        <p:txBody>
+          <a:bodyPr vert="horz" wrap="square" lIns="91440" tIns="45720" rIns="91440" bIns="45720" numCol="1" anchor="t" anchorCtr="0" compatLnSpc="1">
+            <a:prstTxWarp prst="textNoShape">
+              <a:avLst/>
+            </a:prstTxWarp>
+          </a:bodyPr>
+          <a:lstStyle>
+            <a:lvl1pPr marL="360363" indent="-360363" algn="l" rtl="0" eaLnBrk="0" fontAlgn="base" hangingPunct="0">
+              <a:spcBef>
+                <a:spcPct val="20000"/>
+              </a:spcBef>
+              <a:spcAft>
+                <a:spcPct val="0"/>
+              </a:spcAft>
+              <a:buClr>
+                <a:srgbClr val="2AA3D8"/>
+              </a:buClr>
+              <a:buSzPct val="65000"/>
+              <a:buFont typeface="Arial" charset="0"/>
+              <a:buBlip>
+                <a:blip r:embed="rId4"/>
+              </a:buBlip>
+              <a:defRPr sz="2800">
+                <a:solidFill>
+                  <a:schemeClr val="tx1"/>
+                </a:solidFill>
+                <a:latin typeface="+mn-lt"/>
+                <a:ea typeface="+mn-ea"/>
+                <a:cs typeface="+mn-cs"/>
+              </a:defRPr>
+            </a:lvl1pPr>
+            <a:lvl2pPr marL="900113" indent="-360363" algn="l" rtl="0" eaLnBrk="0" fontAlgn="base" hangingPunct="0">
+              <a:spcBef>
+                <a:spcPct val="20000"/>
+              </a:spcBef>
+              <a:spcAft>
+                <a:spcPct val="0"/>
+              </a:spcAft>
+              <a:buClr>
+                <a:srgbClr val="2AA3D8"/>
+              </a:buClr>
+              <a:buSzPct val="65000"/>
+              <a:buFont typeface="Arial" charset="0"/>
+              <a:buBlip>
+                <a:blip r:embed="rId4"/>
+              </a:buBlip>
+              <a:defRPr sz="2400">
+                <a:solidFill>
+                  <a:schemeClr val="tx1"/>
+                </a:solidFill>
+                <a:latin typeface="+mn-lt"/>
+              </a:defRPr>
+            </a:lvl2pPr>
+            <a:lvl3pPr marL="1346200" indent="-266700" algn="l" rtl="0" eaLnBrk="0" fontAlgn="base" hangingPunct="0">
+              <a:spcBef>
+                <a:spcPct val="20000"/>
+              </a:spcBef>
+              <a:spcAft>
+                <a:spcPct val="0"/>
+              </a:spcAft>
+              <a:buClr>
+                <a:srgbClr val="2AA3D8"/>
+              </a:buClr>
+              <a:buSzPct val="65000"/>
+              <a:buFont typeface="Arial" charset="0"/>
+              <a:buBlip>
+                <a:blip r:embed="rId4"/>
+              </a:buBlip>
+              <a:defRPr sz="2000">
+                <a:solidFill>
+                  <a:schemeClr val="tx1"/>
+                </a:solidFill>
+                <a:latin typeface="+mn-lt"/>
+              </a:defRPr>
+            </a:lvl3pPr>
+            <a:lvl4pPr marL="1792288" indent="-266700" algn="l" rtl="0" eaLnBrk="0" fontAlgn="base" hangingPunct="0">
+              <a:spcBef>
+                <a:spcPct val="20000"/>
+              </a:spcBef>
+              <a:spcAft>
+                <a:spcPct val="0"/>
+              </a:spcAft>
+              <a:buClr>
+                <a:srgbClr val="2AA3D8"/>
+              </a:buClr>
+              <a:buSzPct val="65000"/>
+              <a:buFont typeface="Arial" charset="0"/>
+              <a:buBlip>
+                <a:blip r:embed="rId4"/>
+              </a:buBlip>
+              <a:defRPr sz="1800">
+                <a:solidFill>
+                  <a:schemeClr val="tx1"/>
+                </a:solidFill>
+                <a:latin typeface="+mn-lt"/>
+              </a:defRPr>
+            </a:lvl4pPr>
+            <a:lvl5pPr marL="2239963" indent="-268288" algn="l" rtl="0" eaLnBrk="0" fontAlgn="base" hangingPunct="0">
+              <a:spcBef>
+                <a:spcPct val="20000"/>
+              </a:spcBef>
+              <a:spcAft>
+                <a:spcPct val="0"/>
+              </a:spcAft>
+              <a:buClr>
+                <a:srgbClr val="2AA3D8"/>
+              </a:buClr>
+              <a:buSzPct val="65000"/>
+              <a:buFont typeface="Arial" charset="0"/>
+              <a:buBlip>
+                <a:blip r:embed="rId4"/>
+              </a:buBlip>
+              <a:defRPr sz="1800">
+                <a:solidFill>
+                  <a:schemeClr val="tx1"/>
+                </a:solidFill>
+                <a:latin typeface="+mn-lt"/>
+              </a:defRPr>
+            </a:lvl5pPr>
+            <a:lvl6pPr marL="2697163" indent="-268288" algn="l" rtl="0" fontAlgn="base">
+              <a:spcBef>
+                <a:spcPct val="20000"/>
+              </a:spcBef>
+              <a:spcAft>
+                <a:spcPct val="0"/>
+              </a:spcAft>
+              <a:buClr>
+                <a:srgbClr val="2AA3D8"/>
+              </a:buClr>
+              <a:buSzPct val="65000"/>
+              <a:buFont typeface="Arial" charset="0"/>
+              <a:buBlip>
+                <a:blip r:embed="rId4"/>
+              </a:buBlip>
+              <a:defRPr sz="1800">
+                <a:solidFill>
+                  <a:schemeClr val="tx1"/>
+                </a:solidFill>
+                <a:latin typeface="+mn-lt"/>
+              </a:defRPr>
+            </a:lvl6pPr>
+            <a:lvl7pPr marL="3154363" indent="-268288" algn="l" rtl="0" fontAlgn="base">
+              <a:spcBef>
+                <a:spcPct val="20000"/>
+              </a:spcBef>
+              <a:spcAft>
+                <a:spcPct val="0"/>
+              </a:spcAft>
+              <a:buClr>
+                <a:srgbClr val="2AA3D8"/>
+              </a:buClr>
+              <a:buSzPct val="65000"/>
+              <a:buFont typeface="Arial" charset="0"/>
+              <a:buBlip>
+                <a:blip r:embed="rId4"/>
+              </a:buBlip>
+              <a:defRPr sz="1800">
+                <a:solidFill>
+                  <a:schemeClr val="tx1"/>
+                </a:solidFill>
+                <a:latin typeface="+mn-lt"/>
+              </a:defRPr>
+            </a:lvl7pPr>
+            <a:lvl8pPr marL="3611563" indent="-268288" algn="l" rtl="0" fontAlgn="base">
+              <a:spcBef>
+                <a:spcPct val="20000"/>
+              </a:spcBef>
+              <a:spcAft>
+                <a:spcPct val="0"/>
+              </a:spcAft>
+              <a:buClr>
+                <a:srgbClr val="2AA3D8"/>
+              </a:buClr>
+              <a:buSzPct val="65000"/>
+              <a:buFont typeface="Arial" charset="0"/>
+              <a:buBlip>
+                <a:blip r:embed="rId4"/>
+              </a:buBlip>
+              <a:defRPr sz="1800">
+                <a:solidFill>
+                  <a:schemeClr val="tx1"/>
+                </a:solidFill>
+                <a:latin typeface="+mn-lt"/>
+              </a:defRPr>
+            </a:lvl8pPr>
+            <a:lvl9pPr marL="4068763" indent="-268288" algn="l" rtl="0" fontAlgn="base">
+              <a:spcBef>
+                <a:spcPct val="20000"/>
+              </a:spcBef>
+              <a:spcAft>
+                <a:spcPct val="0"/>
+              </a:spcAft>
+              <a:buClr>
+                <a:srgbClr val="2AA3D8"/>
+              </a:buClr>
+              <a:buSzPct val="65000"/>
+              <a:buFont typeface="Arial" charset="0"/>
+              <a:buBlip>
+                <a:blip r:embed="rId4"/>
+              </a:buBlip>
+              <a:defRPr sz="1800">
+                <a:solidFill>
+                  <a:schemeClr val="tx1"/>
+                </a:solidFill>
+                <a:latin typeface="+mn-lt"/>
+              </a:defRPr>
+            </a:lvl9pPr>
+          </a:lstStyle>
+          <a:p>
+            <a:pPr marL="0" indent="0">
+              <a:buNone/>
+            </a:pPr>
+            <a:endParaRPr lang="en-US" kern="0" dirty="0"/>
+          </a:p>
+        </p:txBody>
+      </p:sp>
+      <p:pic>
+        <p:nvPicPr>
+          <p:cNvPr id="12" name="Content Placeholder 10"/>
+          <p:cNvPicPr>
+            <a:picLocks noChangeAspect="1"/>
+          </p:cNvPicPr>
+          <p:nvPr/>
+        </p:nvPicPr>
+        <p:blipFill>
+          <a:blip r:embed="rId5" cstate="print">
+            <a:extLst>
+              <a:ext uri="{28A0092B-C50C-407E-A947-70E740481C1C}">
+                <a14:useLocalDpi xmlns:a14="http://schemas.microsoft.com/office/drawing/2010/main" val="0"/>
+              </a:ext>
+            </a:extLst>
+          </a:blip>
+          <a:stretch>
+            <a:fillRect/>
+          </a:stretch>
+        </p:blipFill>
+        <p:spPr bwMode="auto">
+          <a:xfrm>
+            <a:off x="5743020" y="3535362"/>
+            <a:ext cx="2254222" cy="2520950"/>
+          </a:xfrm>
+          <a:prstGeom prst="rect">
+            <a:avLst/>
+          </a:prstGeom>
+          <a:noFill/>
+          <a:ln w="9525">
+            <a:noFill/>
+            <a:miter lim="800000"/>
+            <a:headEnd/>
+            <a:tailEnd/>
+          </a:ln>
+        </p:spPr>
+      </p:pic>
+      <p:pic>
+        <p:nvPicPr>
+          <p:cNvPr id="13" name="Content Placeholder 9"/>
+          <p:cNvPicPr>
+            <a:picLocks noChangeAspect="1"/>
+          </p:cNvPicPr>
+          <p:nvPr/>
+        </p:nvPicPr>
+        <p:blipFill>
+          <a:blip r:embed="rId6" cstate="print">
+            <a:extLst>
+              <a:ext uri="{28A0092B-C50C-407E-A947-70E740481C1C}">
+                <a14:useLocalDpi xmlns:a14="http://schemas.microsoft.com/office/drawing/2010/main" val="0"/>
+              </a:ext>
+            </a:extLst>
+          </a:blip>
+          <a:stretch>
+            <a:fillRect/>
+          </a:stretch>
+        </p:blipFill>
+        <p:spPr bwMode="auto">
+          <a:xfrm>
+            <a:off x="1220549" y="3611181"/>
+            <a:ext cx="2257733" cy="2369312"/>
+          </a:xfrm>
+          <a:prstGeom prst="rect">
+            <a:avLst/>
+          </a:prstGeom>
+          <a:noFill/>
+          <a:ln w="9525">
+            <a:noFill/>
+            <a:miter lim="800000"/>
+            <a:headEnd/>
+            <a:tailEnd/>
+          </a:ln>
+        </p:spPr>
+      </p:pic>
     </p:spTree>
     <p:extLst>
       <p:ext uri="{BB962C8B-B14F-4D97-AF65-F5344CB8AC3E}">
@@ -21244,60 +22199,64 @@
           </a:p>
         </p:txBody>
       </p:sp>
-      <p:sp>
-        <p:nvSpPr>
-          <p:cNvPr id="3" name="Content Placeholder 2"/>
-          <p:cNvSpPr>
-            <a:spLocks noGrp="1"/>
-          </p:cNvSpPr>
+      <p:pic>
+        <p:nvPicPr>
+          <p:cNvPr id="7" name="Content Placeholder 6"/>
+          <p:cNvPicPr>
+            <a:picLocks noGrp="1" noChangeAspect="1"/>
+          </p:cNvPicPr>
           <p:nvPr>
             <p:ph sz="half" idx="1"/>
           </p:nvPr>
-        </p:nvSpPr>
-        <p:spPr/>
-        <p:txBody>
-          <a:bodyPr/>
-          <a:lstStyle/>
-          <a:p>
-            <a:r>
-              <a:rPr lang="en-US" dirty="0" smtClean="0"/>
-              <a:t>TODO Add </a:t>
-            </a:r>
-            <a:r>
-              <a:rPr lang="en-US" dirty="0" err="1" smtClean="0"/>
-              <a:t>nonfilterd</a:t>
-            </a:r>
-            <a:endParaRPr lang="en-US" dirty="0"/>
-          </a:p>
-        </p:txBody>
-      </p:sp>
-      <p:sp>
-        <p:nvSpPr>
-          <p:cNvPr id="4" name="Content Placeholder 3"/>
-          <p:cNvSpPr>
-            <a:spLocks noGrp="1"/>
-          </p:cNvSpPr>
+        </p:nvPicPr>
+        <p:blipFill>
+          <a:blip r:embed="rId2" cstate="print">
+            <a:extLst>
+              <a:ext uri="{28A0092B-C50C-407E-A947-70E740481C1C}">
+                <a14:useLocalDpi xmlns:a14="http://schemas.microsoft.com/office/drawing/2010/main" val="0"/>
+              </a:ext>
+            </a:extLst>
+          </a:blip>
+          <a:stretch>
+            <a:fillRect/>
+          </a:stretch>
+        </p:blipFill>
+        <p:spPr>
+          <a:xfrm>
+            <a:off x="179388" y="1215582"/>
+            <a:ext cx="4351337" cy="4858635"/>
+          </a:xfrm>
+        </p:spPr>
+      </p:pic>
+      <p:pic>
+        <p:nvPicPr>
+          <p:cNvPr id="8" name="Content Placeholder 7"/>
+          <p:cNvPicPr>
+            <a:picLocks noGrp="1" noChangeAspect="1"/>
+          </p:cNvPicPr>
           <p:nvPr>
             <p:ph sz="half" idx="2"/>
           </p:nvPr>
-        </p:nvSpPr>
-        <p:spPr/>
-        <p:txBody>
-          <a:bodyPr/>
-          <a:lstStyle/>
-          <a:p>
-            <a:r>
-              <a:rPr lang="en-US" dirty="0"/>
-              <a:t>TODO </a:t>
-            </a:r>
-            <a:r>
-              <a:rPr lang="en-US" smtClean="0"/>
-              <a:t>Add filter</a:t>
-            </a:r>
-            <a:endParaRPr lang="en-US" dirty="0"/>
-          </a:p>
-        </p:txBody>
-      </p:sp>
+        </p:nvPicPr>
+        <p:blipFill>
+          <a:blip r:embed="rId3" cstate="print">
+            <a:extLst>
+              <a:ext uri="{28A0092B-C50C-407E-A947-70E740481C1C}">
+                <a14:useLocalDpi xmlns:a14="http://schemas.microsoft.com/office/drawing/2010/main" val="0"/>
+              </a:ext>
+            </a:extLst>
+          </a:blip>
+          <a:stretch>
+            <a:fillRect/>
+          </a:stretch>
+        </p:blipFill>
+        <p:spPr>
+          <a:xfrm>
+            <a:off x="4683125" y="1214278"/>
+            <a:ext cx="4352925" cy="4861243"/>
+          </a:xfrm>
+        </p:spPr>
+      </p:pic>
       <p:sp>
         <p:nvSpPr>
           <p:cNvPr id="5" name="Footer Placeholder 4"/>
@@ -21336,7 +22295,6 @@
               <a:rPr lang="de-AT" dirty="0"/>
               <a:t> David Pfahler</a:t>
             </a:r>
-            <a:endParaRPr lang="de-AT" dirty="0"/>
           </a:p>
         </p:txBody>
       </p:sp>
@@ -21419,56 +22377,64 @@
           </a:p>
         </p:txBody>
       </p:sp>
-      <p:sp>
-        <p:nvSpPr>
-          <p:cNvPr id="3" name="Content Placeholder 2"/>
-          <p:cNvSpPr>
-            <a:spLocks noGrp="1"/>
-          </p:cNvSpPr>
+      <p:pic>
+        <p:nvPicPr>
+          <p:cNvPr id="7" name="Content Placeholder 6"/>
+          <p:cNvPicPr>
+            <a:picLocks noGrp="1" noChangeAspect="1"/>
+          </p:cNvPicPr>
           <p:nvPr>
             <p:ph sz="half" idx="1"/>
           </p:nvPr>
-        </p:nvSpPr>
-        <p:spPr/>
-        <p:txBody>
-          <a:bodyPr/>
-          <a:lstStyle/>
-          <a:p>
-            <a:r>
-              <a:rPr lang="en-US" dirty="0" smtClean="0"/>
-              <a:t>TODO add non filtered</a:t>
-            </a:r>
-            <a:endParaRPr lang="en-US" dirty="0"/>
-          </a:p>
-        </p:txBody>
-      </p:sp>
-      <p:sp>
-        <p:nvSpPr>
-          <p:cNvPr id="4" name="Content Placeholder 3"/>
-          <p:cNvSpPr>
-            <a:spLocks noGrp="1"/>
-          </p:cNvSpPr>
+        </p:nvPicPr>
+        <p:blipFill>
+          <a:blip r:embed="rId2" cstate="print">
+            <a:extLst>
+              <a:ext uri="{28A0092B-C50C-407E-A947-70E740481C1C}">
+                <a14:useLocalDpi xmlns:a14="http://schemas.microsoft.com/office/drawing/2010/main" val="0"/>
+              </a:ext>
+            </a:extLst>
+          </a:blip>
+          <a:stretch>
+            <a:fillRect/>
+          </a:stretch>
+        </p:blipFill>
+        <p:spPr>
+          <a:xfrm>
+            <a:off x="179388" y="1215582"/>
+            <a:ext cx="4351337" cy="4858635"/>
+          </a:xfrm>
+        </p:spPr>
+      </p:pic>
+      <p:pic>
+        <p:nvPicPr>
+          <p:cNvPr id="8" name="Content Placeholder 7"/>
+          <p:cNvPicPr>
+            <a:picLocks noGrp="1" noChangeAspect="1"/>
+          </p:cNvPicPr>
           <p:nvPr>
             <p:ph sz="half" idx="2"/>
           </p:nvPr>
-        </p:nvSpPr>
-        <p:spPr/>
-        <p:txBody>
-          <a:bodyPr/>
-          <a:lstStyle/>
-          <a:p>
-            <a:r>
-              <a:rPr lang="en-US" dirty="0"/>
-              <a:t>TODO add </a:t>
-            </a:r>
-            <a:r>
-              <a:rPr lang="en-US" dirty="0" smtClean="0"/>
-              <a:t>filtered</a:t>
-            </a:r>
-            <a:endParaRPr lang="en-US" dirty="0"/>
-          </a:p>
-        </p:txBody>
-      </p:sp>
+        </p:nvPicPr>
+        <p:blipFill>
+          <a:blip r:embed="rId3" cstate="print">
+            <a:extLst>
+              <a:ext uri="{28A0092B-C50C-407E-A947-70E740481C1C}">
+                <a14:useLocalDpi xmlns:a14="http://schemas.microsoft.com/office/drawing/2010/main" val="0"/>
+              </a:ext>
+            </a:extLst>
+          </a:blip>
+          <a:stretch>
+            <a:fillRect/>
+          </a:stretch>
+        </p:blipFill>
+        <p:spPr>
+          <a:xfrm>
+            <a:off x="4683125" y="1210910"/>
+            <a:ext cx="4352925" cy="4867979"/>
+          </a:xfrm>
+        </p:spPr>
+      </p:pic>
       <p:sp>
         <p:nvSpPr>
           <p:cNvPr id="5" name="Footer Placeholder 4"/>
@@ -21507,7 +22473,6 @@
               <a:rPr lang="de-AT" dirty="0"/>
               <a:t> David Pfahler</a:t>
             </a:r>
-            <a:endParaRPr lang="de-AT" dirty="0"/>
           </a:p>
         </p:txBody>
       </p:sp>
@@ -21584,67 +22549,74 @@
           <a:p>
             <a:r>
               <a:rPr lang="en-US" dirty="0" smtClean="0"/>
-              <a:t>Median Filter</a:t>
+              <a:t>Median </a:t>
+            </a:r>
+            <a:r>
+              <a:rPr lang="en-US" dirty="0" smtClean="0"/>
+              <a:t>Filter 5x5</a:t>
             </a:r>
             <a:endParaRPr lang="en-US" dirty="0"/>
           </a:p>
         </p:txBody>
       </p:sp>
-      <p:sp>
-        <p:nvSpPr>
-          <p:cNvPr id="3" name="Content Placeholder 2"/>
-          <p:cNvSpPr>
-            <a:spLocks noGrp="1"/>
-          </p:cNvSpPr>
+      <p:pic>
+        <p:nvPicPr>
+          <p:cNvPr id="7" name="Content Placeholder 6"/>
+          <p:cNvPicPr>
+            <a:picLocks noGrp="1" noChangeAspect="1"/>
+          </p:cNvPicPr>
           <p:nvPr>
             <p:ph sz="half" idx="1"/>
           </p:nvPr>
-        </p:nvSpPr>
-        <p:spPr/>
-        <p:txBody>
-          <a:bodyPr/>
-          <a:lstStyle/>
-          <a:p>
-            <a:r>
-              <a:rPr lang="en-US" dirty="0"/>
-              <a:t>TODO add non filtered</a:t>
-            </a:r>
-          </a:p>
-          <a:p>
-            <a:endParaRPr lang="en-US" dirty="0"/>
-          </a:p>
-        </p:txBody>
-      </p:sp>
-      <p:sp>
-        <p:nvSpPr>
-          <p:cNvPr id="4" name="Content Placeholder 3"/>
-          <p:cNvSpPr>
-            <a:spLocks noGrp="1"/>
-          </p:cNvSpPr>
+        </p:nvPicPr>
+        <p:blipFill>
+          <a:blip r:embed="rId2" cstate="print">
+            <a:extLst>
+              <a:ext uri="{28A0092B-C50C-407E-A947-70E740481C1C}">
+                <a14:useLocalDpi xmlns:a14="http://schemas.microsoft.com/office/drawing/2010/main" val="0"/>
+              </a:ext>
+            </a:extLst>
+          </a:blip>
+          <a:stretch>
+            <a:fillRect/>
+          </a:stretch>
+        </p:blipFill>
+        <p:spPr>
+          <a:xfrm>
+            <a:off x="179388" y="1215582"/>
+            <a:ext cx="4351337" cy="4858635"/>
+          </a:xfrm>
+        </p:spPr>
+      </p:pic>
+      <p:pic>
+        <p:nvPicPr>
+          <p:cNvPr id="8" name="Content Placeholder 7"/>
+          <p:cNvPicPr>
+            <a:picLocks noGrp="1" noChangeAspect="1"/>
+          </p:cNvPicPr>
           <p:nvPr>
             <p:ph sz="half" idx="2"/>
           </p:nvPr>
-        </p:nvSpPr>
-        <p:spPr/>
-        <p:txBody>
-          <a:bodyPr/>
-          <a:lstStyle/>
-          <a:p>
-            <a:r>
-              <a:rPr lang="en-US" dirty="0"/>
-              <a:t>TODO add </a:t>
-            </a:r>
-            <a:r>
-              <a:rPr lang="en-US" dirty="0" smtClean="0"/>
-              <a:t>filtered</a:t>
-            </a:r>
-            <a:endParaRPr lang="en-US" dirty="0"/>
-          </a:p>
-          <a:p>
-            <a:endParaRPr lang="en-US" dirty="0"/>
-          </a:p>
-        </p:txBody>
-      </p:sp>
+        </p:nvPicPr>
+        <p:blipFill>
+          <a:blip r:embed="rId3" cstate="print">
+            <a:extLst>
+              <a:ext uri="{28A0092B-C50C-407E-A947-70E740481C1C}">
+                <a14:useLocalDpi xmlns:a14="http://schemas.microsoft.com/office/drawing/2010/main" val="0"/>
+              </a:ext>
+            </a:extLst>
+          </a:blip>
+          <a:stretch>
+            <a:fillRect/>
+          </a:stretch>
+        </p:blipFill>
+        <p:spPr>
+          <a:xfrm>
+            <a:off x="4683125" y="1210061"/>
+            <a:ext cx="4352925" cy="4869677"/>
+          </a:xfrm>
+        </p:spPr>
+      </p:pic>
       <p:sp>
         <p:nvSpPr>
           <p:cNvPr id="5" name="Footer Placeholder 4"/>
@@ -21683,7 +22655,6 @@
               <a:rPr lang="de-AT" dirty="0"/>
               <a:t> David Pfahler</a:t>
             </a:r>
-            <a:endParaRPr lang="de-AT" dirty="0"/>
           </a:p>
         </p:txBody>
       </p:sp>

</xml_diff>